<commit_message>
Worked on the introductory section on the Cooper pair box and the Transmon. Created some mathematica files to calculate the parameter of aCPB such as the anharmonicity etc.
</commit_message>
<xml_diff>
--- a/material/figures/introduction/circuit_elements.pptx
+++ b/material/figures/introduction/circuit_elements.pptx
@@ -289,7 +289,8 @@
           <a:p>
             <a:fld id="{5F7A13A3-253F-4613-BFE8-12D242E245DD}" type="datetimeFigureOut">
               <a:rPr lang="de-DE" smtClean="0"/>
-              <a:t>19.05.2012</a:t>
+              <a:pPr/>
+              <a:t>24.05.2012</a:t>
             </a:fld>
             <a:endParaRPr lang="de-DE" dirty="0"/>
           </a:p>
@@ -331,6 +332,7 @@
           <a:p>
             <a:fld id="{1896CE01-DE9A-41FD-8F49-749F545314B9}" type="slidenum">
               <a:rPr lang="de-DE" smtClean="0"/>
+              <a:pPr/>
               <a:t>‹Nr.›</a:t>
             </a:fld>
             <a:endParaRPr lang="de-DE" dirty="0"/>
@@ -454,7 +456,8 @@
           <a:p>
             <a:fld id="{5F7A13A3-253F-4613-BFE8-12D242E245DD}" type="datetimeFigureOut">
               <a:rPr lang="de-DE" smtClean="0"/>
-              <a:t>19.05.2012</a:t>
+              <a:pPr/>
+              <a:t>24.05.2012</a:t>
             </a:fld>
             <a:endParaRPr lang="de-DE" dirty="0"/>
           </a:p>
@@ -496,6 +499,7 @@
           <a:p>
             <a:fld id="{1896CE01-DE9A-41FD-8F49-749F545314B9}" type="slidenum">
               <a:rPr lang="de-DE" smtClean="0"/>
+              <a:pPr/>
               <a:t>‹Nr.›</a:t>
             </a:fld>
             <a:endParaRPr lang="de-DE" dirty="0"/>
@@ -629,7 +633,8 @@
           <a:p>
             <a:fld id="{5F7A13A3-253F-4613-BFE8-12D242E245DD}" type="datetimeFigureOut">
               <a:rPr lang="de-DE" smtClean="0"/>
-              <a:t>19.05.2012</a:t>
+              <a:pPr/>
+              <a:t>24.05.2012</a:t>
             </a:fld>
             <a:endParaRPr lang="de-DE" dirty="0"/>
           </a:p>
@@ -671,6 +676,7 @@
           <a:p>
             <a:fld id="{1896CE01-DE9A-41FD-8F49-749F545314B9}" type="slidenum">
               <a:rPr lang="de-DE" smtClean="0"/>
+              <a:pPr/>
               <a:t>‹Nr.›</a:t>
             </a:fld>
             <a:endParaRPr lang="de-DE" dirty="0"/>
@@ -794,7 +800,8 @@
           <a:p>
             <a:fld id="{5F7A13A3-253F-4613-BFE8-12D242E245DD}" type="datetimeFigureOut">
               <a:rPr lang="de-DE" smtClean="0"/>
-              <a:t>19.05.2012</a:t>
+              <a:pPr/>
+              <a:t>24.05.2012</a:t>
             </a:fld>
             <a:endParaRPr lang="de-DE" dirty="0"/>
           </a:p>
@@ -836,6 +843,7 @@
           <a:p>
             <a:fld id="{1896CE01-DE9A-41FD-8F49-749F545314B9}" type="slidenum">
               <a:rPr lang="de-DE" smtClean="0"/>
+              <a:pPr/>
               <a:t>‹Nr.›</a:t>
             </a:fld>
             <a:endParaRPr lang="de-DE" dirty="0"/>
@@ -1035,7 +1043,8 @@
           <a:p>
             <a:fld id="{5F7A13A3-253F-4613-BFE8-12D242E245DD}" type="datetimeFigureOut">
               <a:rPr lang="de-DE" smtClean="0"/>
-              <a:t>19.05.2012</a:t>
+              <a:pPr/>
+              <a:t>24.05.2012</a:t>
             </a:fld>
             <a:endParaRPr lang="de-DE" dirty="0"/>
           </a:p>
@@ -1077,6 +1086,7 @@
           <a:p>
             <a:fld id="{1896CE01-DE9A-41FD-8F49-749F545314B9}" type="slidenum">
               <a:rPr lang="de-DE" smtClean="0"/>
+              <a:pPr/>
               <a:t>‹Nr.›</a:t>
             </a:fld>
             <a:endParaRPr lang="de-DE" dirty="0"/>
@@ -1318,7 +1328,8 @@
           <a:p>
             <a:fld id="{5F7A13A3-253F-4613-BFE8-12D242E245DD}" type="datetimeFigureOut">
               <a:rPr lang="de-DE" smtClean="0"/>
-              <a:t>19.05.2012</a:t>
+              <a:pPr/>
+              <a:t>24.05.2012</a:t>
             </a:fld>
             <a:endParaRPr lang="de-DE" dirty="0"/>
           </a:p>
@@ -1360,6 +1371,7 @@
           <a:p>
             <a:fld id="{1896CE01-DE9A-41FD-8F49-749F545314B9}" type="slidenum">
               <a:rPr lang="de-DE" smtClean="0"/>
+              <a:pPr/>
               <a:t>‹Nr.›</a:t>
             </a:fld>
             <a:endParaRPr lang="de-DE" dirty="0"/>
@@ -1735,7 +1747,8 @@
           <a:p>
             <a:fld id="{5F7A13A3-253F-4613-BFE8-12D242E245DD}" type="datetimeFigureOut">
               <a:rPr lang="de-DE" smtClean="0"/>
-              <a:t>19.05.2012</a:t>
+              <a:pPr/>
+              <a:t>24.05.2012</a:t>
             </a:fld>
             <a:endParaRPr lang="de-DE" dirty="0"/>
           </a:p>
@@ -1777,6 +1790,7 @@
           <a:p>
             <a:fld id="{1896CE01-DE9A-41FD-8F49-749F545314B9}" type="slidenum">
               <a:rPr lang="de-DE" smtClean="0"/>
+              <a:pPr/>
               <a:t>‹Nr.›</a:t>
             </a:fld>
             <a:endParaRPr lang="de-DE" dirty="0"/>
@@ -1848,7 +1862,8 @@
           <a:p>
             <a:fld id="{5F7A13A3-253F-4613-BFE8-12D242E245DD}" type="datetimeFigureOut">
               <a:rPr lang="de-DE" smtClean="0"/>
-              <a:t>19.05.2012</a:t>
+              <a:pPr/>
+              <a:t>24.05.2012</a:t>
             </a:fld>
             <a:endParaRPr lang="de-DE" dirty="0"/>
           </a:p>
@@ -1890,6 +1905,7 @@
           <a:p>
             <a:fld id="{1896CE01-DE9A-41FD-8F49-749F545314B9}" type="slidenum">
               <a:rPr lang="de-DE" smtClean="0"/>
+              <a:pPr/>
               <a:t>‹Nr.›</a:t>
             </a:fld>
             <a:endParaRPr lang="de-DE" dirty="0"/>
@@ -1938,7 +1954,8 @@
           <a:p>
             <a:fld id="{5F7A13A3-253F-4613-BFE8-12D242E245DD}" type="datetimeFigureOut">
               <a:rPr lang="de-DE" smtClean="0"/>
-              <a:t>19.05.2012</a:t>
+              <a:pPr/>
+              <a:t>24.05.2012</a:t>
             </a:fld>
             <a:endParaRPr lang="de-DE" dirty="0"/>
           </a:p>
@@ -1980,6 +1997,7 @@
           <a:p>
             <a:fld id="{1896CE01-DE9A-41FD-8F49-749F545314B9}" type="slidenum">
               <a:rPr lang="de-DE" smtClean="0"/>
+              <a:pPr/>
               <a:t>‹Nr.›</a:t>
             </a:fld>
             <a:endParaRPr lang="de-DE" dirty="0"/>
@@ -2210,7 +2228,8 @@
           <a:p>
             <a:fld id="{5F7A13A3-253F-4613-BFE8-12D242E245DD}" type="datetimeFigureOut">
               <a:rPr lang="de-DE" smtClean="0"/>
-              <a:t>19.05.2012</a:t>
+              <a:pPr/>
+              <a:t>24.05.2012</a:t>
             </a:fld>
             <a:endParaRPr lang="de-DE" dirty="0"/>
           </a:p>
@@ -2252,6 +2271,7 @@
           <a:p>
             <a:fld id="{1896CE01-DE9A-41FD-8F49-749F545314B9}" type="slidenum">
               <a:rPr lang="de-DE" smtClean="0"/>
+              <a:pPr/>
               <a:t>‹Nr.›</a:t>
             </a:fld>
             <a:endParaRPr lang="de-DE" dirty="0"/>
@@ -2458,7 +2478,8 @@
           <a:p>
             <a:fld id="{5F7A13A3-253F-4613-BFE8-12D242E245DD}" type="datetimeFigureOut">
               <a:rPr lang="de-DE" smtClean="0"/>
-              <a:t>19.05.2012</a:t>
+              <a:pPr/>
+              <a:t>24.05.2012</a:t>
             </a:fld>
             <a:endParaRPr lang="de-DE" dirty="0"/>
           </a:p>
@@ -2500,6 +2521,7 @@
           <a:p>
             <a:fld id="{1896CE01-DE9A-41FD-8F49-749F545314B9}" type="slidenum">
               <a:rPr lang="de-DE" smtClean="0"/>
+              <a:pPr/>
               <a:t>‹Nr.›</a:t>
             </a:fld>
             <a:endParaRPr lang="de-DE" dirty="0"/>
@@ -2666,7 +2688,8 @@
           <a:p>
             <a:fld id="{5F7A13A3-253F-4613-BFE8-12D242E245DD}" type="datetimeFigureOut">
               <a:rPr lang="de-DE" smtClean="0"/>
-              <a:t>19.05.2012</a:t>
+              <a:pPr/>
+              <a:t>24.05.2012</a:t>
             </a:fld>
             <a:endParaRPr lang="de-DE" dirty="0"/>
           </a:p>
@@ -2744,6 +2767,7 @@
           <a:p>
             <a:fld id="{1896CE01-DE9A-41FD-8F49-749F545314B9}" type="slidenum">
               <a:rPr lang="de-DE" smtClean="0"/>
+              <a:pPr/>
               <a:t>‹Nr.›</a:t>
             </a:fld>
             <a:endParaRPr lang="de-DE" dirty="0"/>
@@ -3050,7 +3074,7 @@
           <a:prstGeom prst="line">
             <a:avLst/>
           </a:prstGeom>
-          <a:ln w="28575">
+          <a:ln w="19050">
             <a:solidFill>
               <a:schemeClr val="tx1"/>
             </a:solidFill>
@@ -3087,7 +3111,7 @@
           <a:prstGeom prst="line">
             <a:avLst/>
           </a:prstGeom>
-          <a:ln w="57150">
+          <a:ln w="19050">
             <a:solidFill>
               <a:schemeClr val="tx1"/>
             </a:solidFill>
@@ -3122,7 +3146,7 @@
           <a:prstGeom prst="line">
             <a:avLst/>
           </a:prstGeom>
-          <a:ln w="57150">
+          <a:ln w="19050">
             <a:solidFill>
               <a:schemeClr val="tx1"/>
             </a:solidFill>
@@ -3157,7 +3181,7 @@
           <a:prstGeom prst="line">
             <a:avLst/>
           </a:prstGeom>
-          <a:ln w="28575">
+          <a:ln w="19050">
             <a:solidFill>
               <a:schemeClr val="tx1"/>
             </a:solidFill>
@@ -3194,7 +3218,7 @@
           <a:prstGeom prst="line">
             <a:avLst/>
           </a:prstGeom>
-          <a:ln w="57150">
+          <a:ln w="19050">
             <a:solidFill>
               <a:schemeClr val="tx1"/>
             </a:solidFill>
@@ -3223,10 +3247,10 @@
         </p:nvGrpSpPr>
         <p:grpSpPr>
           <a:xfrm>
-            <a:off x="2411760" y="908720"/>
-            <a:ext cx="156407" cy="720080"/>
-            <a:chOff x="2411760" y="908720"/>
-            <a:chExt cx="156407" cy="720080"/>
+            <a:off x="2411760" y="929864"/>
+            <a:ext cx="156407" cy="698936"/>
+            <a:chOff x="2411760" y="929864"/>
+            <a:chExt cx="156407" cy="698936"/>
           </a:xfrm>
         </p:grpSpPr>
         <p:grpSp>
@@ -3260,7 +3284,7 @@
                   <a:gd name="adj2" fmla="val 5376446"/>
                 </a:avLst>
               </a:prstGeom>
-              <a:ln w="57150">
+              <a:ln w="19050">
                 <a:solidFill>
                   <a:schemeClr val="tx1"/>
                 </a:solidFill>
@@ -3306,7 +3330,7 @@
                   <a:gd name="adj2" fmla="val 5376446"/>
                 </a:avLst>
               </a:prstGeom>
-              <a:ln w="57150">
+              <a:ln w="19050">
                 <a:solidFill>
                   <a:schemeClr val="tx1"/>
                 </a:solidFill>
@@ -3352,7 +3376,7 @@
                   <a:gd name="adj2" fmla="val 5376446"/>
                 </a:avLst>
               </a:prstGeom>
-              <a:ln w="57150">
+              <a:ln w="19050">
                 <a:solidFill>
                   <a:schemeClr val="tx1"/>
                 </a:solidFill>
@@ -3398,7 +3422,7 @@
                   <a:gd name="adj2" fmla="val 5376446"/>
                 </a:avLst>
               </a:prstGeom>
-              <a:ln w="57150">
+              <a:ln w="19050">
                 <a:solidFill>
                   <a:schemeClr val="tx1"/>
                 </a:solidFill>
@@ -3436,13 +3460,13 @@
           </p:nvCxnSpPr>
           <p:spPr>
             <a:xfrm>
-              <a:off x="2492733" y="908720"/>
+              <a:off x="2487447" y="929864"/>
               <a:ext cx="0" cy="144016"/>
             </a:xfrm>
             <a:prstGeom prst="line">
               <a:avLst/>
             </a:prstGeom>
-            <a:ln w="28575">
+            <a:ln w="19050">
               <a:solidFill>
                 <a:schemeClr val="tx1"/>
               </a:solidFill>
@@ -3479,7 +3503,7 @@
             <a:prstGeom prst="line">
               <a:avLst/>
             </a:prstGeom>
-            <a:ln w="28575">
+            <a:ln w="19050">
               <a:solidFill>
                 <a:schemeClr val="tx1"/>
               </a:solidFill>
@@ -3517,7 +3541,7 @@
           <a:prstGeom prst="line">
             <a:avLst/>
           </a:prstGeom>
-          <a:ln w="57150">
+          <a:ln w="19050">
             <a:solidFill>
               <a:schemeClr val="tx1"/>
             </a:solidFill>
@@ -3552,7 +3576,7 @@
           <a:prstGeom prst="line">
             <a:avLst/>
           </a:prstGeom>
-          <a:ln w="28575">
+          <a:ln w="19050">
             <a:solidFill>
               <a:schemeClr val="tx1"/>
             </a:solidFill>
@@ -3690,60 +3714,10 @@
           <a:chExt cx="0" cy="0"/>
         </a:xfrm>
       </p:grpSpPr>
-      <p:sp>
-        <p:nvSpPr>
-          <p:cNvPr id="4" name="Rechteck 3"/>
-          <p:cNvSpPr/>
-          <p:nvPr/>
-        </p:nvSpPr>
-        <p:spPr>
-          <a:xfrm>
-            <a:off x="1763688" y="2492896"/>
-            <a:ext cx="1008112" cy="792088"/>
-          </a:xfrm>
-          <a:prstGeom prst="rect">
-            <a:avLst/>
-          </a:prstGeom>
-          <a:solidFill>
-            <a:schemeClr val="bg1"/>
-          </a:solidFill>
-          <a:ln w="28575">
-            <a:solidFill>
-              <a:schemeClr val="tx1"/>
-            </a:solidFill>
-          </a:ln>
-        </p:spPr>
-        <p:style>
-          <a:lnRef idx="2">
-            <a:schemeClr val="accent1">
-              <a:shade val="50000"/>
-            </a:schemeClr>
-          </a:lnRef>
-          <a:fillRef idx="1">
-            <a:schemeClr val="accent1"/>
-          </a:fillRef>
-          <a:effectRef idx="0">
-            <a:schemeClr val="accent1"/>
-          </a:effectRef>
-          <a:fontRef idx="minor">
-            <a:schemeClr val="lt1"/>
-          </a:fontRef>
-        </p:style>
-        <p:txBody>
-          <a:bodyPr rtlCol="0" anchor="ctr"/>
-          <a:lstStyle/>
-          <a:p>
-            <a:pPr algn="ctr"/>
-            <a:endParaRPr lang="de-DE"/>
-          </a:p>
-        </p:txBody>
-      </p:sp>
       <p:cxnSp>
         <p:nvCxnSpPr>
           <p:cNvPr id="7" name="Gerade Verbindung 6"/>
-          <p:cNvCxnSpPr>
-            <a:endCxn id="4" idx="0"/>
-          </p:cNvCxnSpPr>
+          <p:cNvCxnSpPr/>
           <p:nvPr/>
         </p:nvCxnSpPr>
         <p:spPr>
@@ -3754,7 +3728,7 @@
           <a:prstGeom prst="line">
             <a:avLst/>
           </a:prstGeom>
-          <a:ln w="28575">
+          <a:ln w="19050">
             <a:solidFill>
               <a:schemeClr val="tx1"/>
             </a:solidFill>
@@ -3780,9 +3754,7 @@
       <p:cxnSp>
         <p:nvCxnSpPr>
           <p:cNvPr id="6" name="Gerade Verbindung 5"/>
-          <p:cNvCxnSpPr>
-            <a:stCxn id="4" idx="2"/>
-          </p:cNvCxnSpPr>
+          <p:cNvCxnSpPr/>
           <p:nvPr/>
         </p:nvCxnSpPr>
         <p:spPr>
@@ -3793,7 +3765,7 @@
           <a:prstGeom prst="line">
             <a:avLst/>
           </a:prstGeom>
-          <a:ln w="28575">
+          <a:ln w="19050">
             <a:solidFill>
               <a:schemeClr val="tx1"/>
             </a:solidFill>
@@ -3816,91 +3788,6 @@
           </a:fontRef>
         </p:style>
       </p:cxnSp>
-      <p:grpSp>
-        <p:nvGrpSpPr>
-          <p:cNvPr id="12" name="Gruppieren 11"/>
-          <p:cNvGrpSpPr/>
-          <p:nvPr/>
-        </p:nvGrpSpPr>
-        <p:grpSpPr>
-          <a:xfrm>
-            <a:off x="1619672" y="2726850"/>
-            <a:ext cx="288032" cy="288032"/>
-            <a:chOff x="971600" y="1124744"/>
-            <a:chExt cx="288032" cy="288032"/>
-          </a:xfrm>
-        </p:grpSpPr>
-        <p:cxnSp>
-          <p:nvCxnSpPr>
-            <p:cNvPr id="10" name="Gerade Verbindung 9"/>
-            <p:cNvCxnSpPr/>
-            <p:nvPr/>
-          </p:nvCxnSpPr>
-          <p:spPr>
-            <a:xfrm>
-              <a:off x="971600" y="1124744"/>
-              <a:ext cx="288032" cy="288032"/>
-            </a:xfrm>
-            <a:prstGeom prst="line">
-              <a:avLst/>
-            </a:prstGeom>
-            <a:ln w="57150">
-              <a:solidFill>
-                <a:schemeClr val="tx1"/>
-              </a:solidFill>
-            </a:ln>
-          </p:spPr>
-          <p:style>
-            <a:lnRef idx="1">
-              <a:schemeClr val="accent1"/>
-            </a:lnRef>
-            <a:fillRef idx="0">
-              <a:schemeClr val="accent1"/>
-            </a:fillRef>
-            <a:effectRef idx="0">
-              <a:schemeClr val="accent1"/>
-            </a:effectRef>
-            <a:fontRef idx="minor">
-              <a:schemeClr val="tx1"/>
-            </a:fontRef>
-          </p:style>
-        </p:cxnSp>
-        <p:cxnSp>
-          <p:nvCxnSpPr>
-            <p:cNvPr id="11" name="Gerade Verbindung 10"/>
-            <p:cNvCxnSpPr/>
-            <p:nvPr/>
-          </p:nvCxnSpPr>
-          <p:spPr>
-            <a:xfrm flipV="1">
-              <a:off x="971600" y="1124744"/>
-              <a:ext cx="288032" cy="288032"/>
-            </a:xfrm>
-            <a:prstGeom prst="line">
-              <a:avLst/>
-            </a:prstGeom>
-            <a:ln w="57150">
-              <a:solidFill>
-                <a:schemeClr val="tx1"/>
-              </a:solidFill>
-            </a:ln>
-          </p:spPr>
-          <p:style>
-            <a:lnRef idx="1">
-              <a:schemeClr val="accent1"/>
-            </a:lnRef>
-            <a:fillRef idx="0">
-              <a:schemeClr val="accent1"/>
-            </a:fillRef>
-            <a:effectRef idx="0">
-              <a:schemeClr val="accent1"/>
-            </a:effectRef>
-            <a:fontRef idx="minor">
-              <a:schemeClr val="tx1"/>
-            </a:fontRef>
-          </p:style>
-        </p:cxnSp>
-      </p:grpSp>
       <p:grpSp>
         <p:nvGrpSpPr>
           <p:cNvPr id="22" name="Gruppieren 21"/>
@@ -3915,52 +3802,6 @@
             <a:chExt cx="432048" cy="144016"/>
           </a:xfrm>
         </p:grpSpPr>
-        <p:sp>
-          <p:nvSpPr>
-            <p:cNvPr id="15" name="Rechteck 14"/>
-            <p:cNvSpPr/>
-            <p:nvPr/>
-          </p:nvSpPr>
-          <p:spPr>
-            <a:xfrm>
-              <a:off x="2987824" y="2564904"/>
-              <a:ext cx="432048" cy="144016"/>
-            </a:xfrm>
-            <a:prstGeom prst="rect">
-              <a:avLst/>
-            </a:prstGeom>
-            <a:solidFill>
-              <a:schemeClr val="bg1"/>
-            </a:solidFill>
-            <a:ln>
-              <a:noFill/>
-            </a:ln>
-          </p:spPr>
-          <p:style>
-            <a:lnRef idx="2">
-              <a:schemeClr val="accent1">
-                <a:shade val="50000"/>
-              </a:schemeClr>
-            </a:lnRef>
-            <a:fillRef idx="1">
-              <a:schemeClr val="accent1"/>
-            </a:fillRef>
-            <a:effectRef idx="0">
-              <a:schemeClr val="accent1"/>
-            </a:effectRef>
-            <a:fontRef idx="minor">
-              <a:schemeClr val="lt1"/>
-            </a:fontRef>
-          </p:style>
-          <p:txBody>
-            <a:bodyPr rtlCol="0" anchor="ctr"/>
-            <a:lstStyle/>
-            <a:p>
-              <a:pPr algn="ctr"/>
-              <a:endParaRPr lang="de-DE"/>
-            </a:p>
-          </p:txBody>
-        </p:sp>
         <p:cxnSp>
           <p:nvCxnSpPr>
             <p:cNvPr id="13" name="Gerade Verbindung 12"/>
@@ -3975,7 +3816,7 @@
             <a:prstGeom prst="line">
               <a:avLst/>
             </a:prstGeom>
-            <a:ln w="57150">
+            <a:ln w="19050">
               <a:solidFill>
                 <a:schemeClr val="tx1"/>
               </a:solidFill>
@@ -4010,127 +3851,7 @@
             <a:prstGeom prst="line">
               <a:avLst/>
             </a:prstGeom>
-            <a:ln w="57150">
-              <a:solidFill>
-                <a:schemeClr val="tx1"/>
-              </a:solidFill>
-            </a:ln>
-          </p:spPr>
-          <p:style>
-            <a:lnRef idx="1">
-              <a:schemeClr val="accent1"/>
-            </a:lnRef>
-            <a:fillRef idx="0">
-              <a:schemeClr val="accent1"/>
-            </a:fillRef>
-            <a:effectRef idx="0">
-              <a:schemeClr val="accent1"/>
-            </a:effectRef>
-            <a:fontRef idx="minor">
-              <a:schemeClr val="tx1"/>
-            </a:fontRef>
-          </p:style>
-        </p:cxnSp>
-      </p:grpSp>
-      <p:grpSp>
-        <p:nvGrpSpPr>
-          <p:cNvPr id="29" name="Gruppieren 28"/>
-          <p:cNvGrpSpPr/>
-          <p:nvPr/>
-        </p:nvGrpSpPr>
-        <p:grpSpPr>
-          <a:xfrm>
-            <a:off x="1979712" y="3717032"/>
-            <a:ext cx="576064" cy="144016"/>
-            <a:chOff x="1979712" y="3717032"/>
-            <a:chExt cx="576064" cy="144016"/>
-          </a:xfrm>
-        </p:grpSpPr>
-        <p:cxnSp>
-          <p:nvCxnSpPr>
-            <p:cNvPr id="24" name="Gerade Verbindung 23"/>
-            <p:cNvCxnSpPr/>
-            <p:nvPr/>
-          </p:nvCxnSpPr>
-          <p:spPr>
-            <a:xfrm>
-              <a:off x="1979712" y="3717032"/>
-              <a:ext cx="576064" cy="0"/>
-            </a:xfrm>
-            <a:prstGeom prst="line">
-              <a:avLst/>
-            </a:prstGeom>
-            <a:ln w="57150">
-              <a:solidFill>
-                <a:schemeClr val="tx1"/>
-              </a:solidFill>
-            </a:ln>
-          </p:spPr>
-          <p:style>
-            <a:lnRef idx="1">
-              <a:schemeClr val="accent1"/>
-            </a:lnRef>
-            <a:fillRef idx="0">
-              <a:schemeClr val="accent1"/>
-            </a:fillRef>
-            <a:effectRef idx="0">
-              <a:schemeClr val="accent1"/>
-            </a:effectRef>
-            <a:fontRef idx="minor">
-              <a:schemeClr val="tx1"/>
-            </a:fontRef>
-          </p:style>
-        </p:cxnSp>
-        <p:cxnSp>
-          <p:nvCxnSpPr>
-            <p:cNvPr id="25" name="Gerade Verbindung 24"/>
-            <p:cNvCxnSpPr/>
-            <p:nvPr/>
-          </p:nvCxnSpPr>
-          <p:spPr>
-            <a:xfrm>
-              <a:off x="2051720" y="3789040"/>
-              <a:ext cx="432048" cy="0"/>
-            </a:xfrm>
-            <a:prstGeom prst="line">
-              <a:avLst/>
-            </a:prstGeom>
-            <a:ln w="57150">
-              <a:solidFill>
-                <a:schemeClr val="tx1"/>
-              </a:solidFill>
-            </a:ln>
-          </p:spPr>
-          <p:style>
-            <a:lnRef idx="1">
-              <a:schemeClr val="accent1"/>
-            </a:lnRef>
-            <a:fillRef idx="0">
-              <a:schemeClr val="accent1"/>
-            </a:fillRef>
-            <a:effectRef idx="0">
-              <a:schemeClr val="accent1"/>
-            </a:effectRef>
-            <a:fontRef idx="minor">
-              <a:schemeClr val="tx1"/>
-            </a:fontRef>
-          </p:style>
-        </p:cxnSp>
-        <p:cxnSp>
-          <p:nvCxnSpPr>
-            <p:cNvPr id="26" name="Gerade Verbindung 25"/>
-            <p:cNvCxnSpPr/>
-            <p:nvPr/>
-          </p:nvCxnSpPr>
-          <p:spPr>
-            <a:xfrm>
-              <a:off x="2123728" y="3861048"/>
-              <a:ext cx="288032" cy="0"/>
-            </a:xfrm>
-            <a:prstGeom prst="line">
-              <a:avLst/>
-            </a:prstGeom>
-            <a:ln w="57150">
+            <a:ln w="19050">
               <a:solidFill>
                 <a:schemeClr val="tx1"/>
               </a:solidFill>
@@ -4161,12 +3882,12 @@
         <p:spPr>
           <a:xfrm>
             <a:off x="2258779" y="2060848"/>
-            <a:ext cx="1665149" cy="0"/>
+            <a:ext cx="1377117" cy="0"/>
           </a:xfrm>
           <a:prstGeom prst="line">
             <a:avLst/>
           </a:prstGeom>
-          <a:ln w="28575">
+          <a:ln w="19050">
             <a:solidFill>
               <a:schemeClr val="tx1"/>
             </a:solidFill>
@@ -4195,13 +3916,13 @@
         </p:nvCxnSpPr>
         <p:spPr>
           <a:xfrm>
-            <a:off x="3923928" y="2051883"/>
-            <a:ext cx="0" cy="936104"/>
+            <a:off x="3635896" y="2051883"/>
+            <a:ext cx="0" cy="1665149"/>
           </a:xfrm>
           <a:prstGeom prst="line">
             <a:avLst/>
           </a:prstGeom>
-          <a:ln w="28575">
+          <a:ln w="19050">
             <a:solidFill>
               <a:schemeClr val="tx1"/>
             </a:solidFill>
@@ -4224,38 +3945,411 @@
           </a:fontRef>
         </p:style>
       </p:cxnSp>
+      <p:sp>
+        <p:nvSpPr>
+          <p:cNvPr id="30" name="Ellipse 29"/>
+          <p:cNvSpPr/>
+          <p:nvPr/>
+        </p:nvSpPr>
+        <p:spPr>
+          <a:xfrm>
+            <a:off x="2771800" y="1844824"/>
+            <a:ext cx="432048" cy="432048"/>
+          </a:xfrm>
+          <a:prstGeom prst="ellipse">
+            <a:avLst/>
+          </a:prstGeom>
+          <a:solidFill>
+            <a:schemeClr val="bg1"/>
+          </a:solidFill>
+          <a:ln w="19050">
+            <a:solidFill>
+              <a:schemeClr val="tx1"/>
+            </a:solidFill>
+          </a:ln>
+        </p:spPr>
+        <p:style>
+          <a:lnRef idx="2">
+            <a:schemeClr val="accent1">
+              <a:shade val="50000"/>
+            </a:schemeClr>
+          </a:lnRef>
+          <a:fillRef idx="1">
+            <a:schemeClr val="accent1"/>
+          </a:fillRef>
+          <a:effectRef idx="0">
+            <a:schemeClr val="accent1"/>
+          </a:effectRef>
+          <a:fontRef idx="minor">
+            <a:schemeClr val="lt1"/>
+          </a:fontRef>
+        </p:style>
+        <p:txBody>
+          <a:bodyPr rtlCol="0" anchor="ctr"/>
+          <a:lstStyle/>
+          <a:p>
+            <a:pPr algn="ctr"/>
+            <a:r>
+              <a:rPr lang="de-DE" i="1" dirty="0" smtClean="0">
+                <a:solidFill>
+                  <a:schemeClr val="tx1"/>
+                </a:solidFill>
+                <a:latin typeface="Times New Roman" pitchFamily="18" charset="0"/>
+                <a:cs typeface="Times New Roman" pitchFamily="18" charset="0"/>
+              </a:rPr>
+              <a:t>V</a:t>
+            </a:r>
+            <a:endParaRPr lang="de-DE" i="1" dirty="0">
+              <a:solidFill>
+                <a:schemeClr val="tx1"/>
+              </a:solidFill>
+              <a:latin typeface="Times New Roman" pitchFamily="18" charset="0"/>
+              <a:cs typeface="Times New Roman" pitchFamily="18" charset="0"/>
+            </a:endParaRPr>
+          </a:p>
+        </p:txBody>
+      </p:sp>
+      <p:sp>
+        <p:nvSpPr>
+          <p:cNvPr id="42" name="Textfeld 41"/>
+          <p:cNvSpPr txBox="1"/>
+          <p:nvPr/>
+        </p:nvSpPr>
+        <p:spPr>
+          <a:xfrm>
+            <a:off x="1967662" y="2132856"/>
+            <a:ext cx="300082" cy="369332"/>
+          </a:xfrm>
+          <a:prstGeom prst="rect">
+            <a:avLst/>
+          </a:prstGeom>
+          <a:noFill/>
+        </p:spPr>
+        <p:txBody>
+          <a:bodyPr wrap="none" rtlCol="0">
+            <a:spAutoFit/>
+          </a:bodyPr>
+          <a:lstStyle/>
+          <a:p>
+            <a:r>
+              <a:rPr lang="de-DE" i="1" dirty="0" smtClean="0">
+                <a:latin typeface="Times New Roman" pitchFamily="18" charset="0"/>
+                <a:cs typeface="Times New Roman" pitchFamily="18" charset="0"/>
+              </a:rPr>
+              <a:t>1</a:t>
+            </a:r>
+            <a:endParaRPr lang="de-DE" i="1" baseline="-25000" dirty="0">
+              <a:latin typeface="Times New Roman" pitchFamily="18" charset="0"/>
+              <a:cs typeface="Times New Roman" pitchFamily="18" charset="0"/>
+            </a:endParaRPr>
+          </a:p>
+        </p:txBody>
+      </p:sp>
+      <p:sp>
+        <p:nvSpPr>
+          <p:cNvPr id="45" name="Textfeld 44"/>
+          <p:cNvSpPr txBox="1"/>
+          <p:nvPr/>
+        </p:nvSpPr>
+        <p:spPr>
+          <a:xfrm>
+            <a:off x="1403648" y="2672772"/>
+            <a:ext cx="312906" cy="369332"/>
+          </a:xfrm>
+          <a:prstGeom prst="rect">
+            <a:avLst/>
+          </a:prstGeom>
+          <a:noFill/>
+        </p:spPr>
+        <p:txBody>
+          <a:bodyPr wrap="none" rtlCol="0">
+            <a:spAutoFit/>
+          </a:bodyPr>
+          <a:lstStyle/>
+          <a:p>
+            <a:r>
+              <a:rPr lang="de-DE" i="1" dirty="0" smtClean="0">
+                <a:latin typeface="Times New Roman" pitchFamily="18" charset="0"/>
+                <a:cs typeface="Times New Roman" pitchFamily="18" charset="0"/>
+              </a:rPr>
+              <a:t>L</a:t>
+            </a:r>
+            <a:endParaRPr lang="de-DE" i="1" baseline="-25000" dirty="0">
+              <a:latin typeface="Times New Roman" pitchFamily="18" charset="0"/>
+              <a:cs typeface="Times New Roman" pitchFamily="18" charset="0"/>
+            </a:endParaRPr>
+          </a:p>
+        </p:txBody>
+      </p:sp>
+      <p:sp>
+        <p:nvSpPr>
+          <p:cNvPr id="46" name="Textfeld 45"/>
+          <p:cNvSpPr txBox="1"/>
+          <p:nvPr/>
+        </p:nvSpPr>
+        <p:spPr>
+          <a:xfrm>
+            <a:off x="3009310" y="2672733"/>
+            <a:ext cx="338554" cy="369332"/>
+          </a:xfrm>
+          <a:prstGeom prst="rect">
+            <a:avLst/>
+          </a:prstGeom>
+          <a:noFill/>
+        </p:spPr>
+        <p:txBody>
+          <a:bodyPr wrap="none" rtlCol="0">
+            <a:spAutoFit/>
+          </a:bodyPr>
+          <a:lstStyle/>
+          <a:p>
+            <a:r>
+              <a:rPr lang="de-DE" i="1" dirty="0" smtClean="0">
+                <a:latin typeface="Times New Roman" pitchFamily="18" charset="0"/>
+                <a:cs typeface="Times New Roman" pitchFamily="18" charset="0"/>
+              </a:rPr>
+              <a:t>C</a:t>
+            </a:r>
+            <a:endParaRPr lang="de-DE" i="1" baseline="-25000" dirty="0">
+              <a:latin typeface="Times New Roman" pitchFamily="18" charset="0"/>
+              <a:cs typeface="Times New Roman" pitchFamily="18" charset="0"/>
+            </a:endParaRPr>
+          </a:p>
+        </p:txBody>
+      </p:sp>
       <p:grpSp>
         <p:nvGrpSpPr>
-          <p:cNvPr id="35" name="Gruppieren 34"/>
+          <p:cNvPr id="60" name="Gruppieren 59"/>
           <p:cNvGrpSpPr/>
           <p:nvPr/>
         </p:nvGrpSpPr>
         <p:grpSpPr>
-          <a:xfrm>
-            <a:off x="3635896" y="2996952"/>
-            <a:ext cx="576064" cy="144016"/>
-            <a:chOff x="1979712" y="3717032"/>
-            <a:chExt cx="576064" cy="144016"/>
+          <a:xfrm flipH="1">
+            <a:off x="1700645" y="2492896"/>
+            <a:ext cx="156407" cy="720080"/>
+            <a:chOff x="2411760" y="908720"/>
+            <a:chExt cx="156407" cy="720080"/>
           </a:xfrm>
         </p:grpSpPr>
+        <p:grpSp>
+          <p:nvGrpSpPr>
+            <p:cNvPr id="61" name="Gruppieren 26"/>
+            <p:cNvGrpSpPr/>
+            <p:nvPr/>
+          </p:nvGrpSpPr>
+          <p:grpSpPr>
+            <a:xfrm>
+              <a:off x="2411760" y="1077547"/>
+              <a:ext cx="156407" cy="407237"/>
+              <a:chOff x="3263465" y="1394775"/>
+              <a:chExt cx="384822" cy="1577366"/>
+            </a:xfrm>
+          </p:grpSpPr>
+          <p:sp>
+            <p:nvSpPr>
+              <p:cNvPr id="64" name="Bogen 63"/>
+              <p:cNvSpPr/>
+              <p:nvPr/>
+            </p:nvSpPr>
+            <p:spPr>
+              <a:xfrm rot="11021761" flipH="1" flipV="1">
+                <a:off x="3263465" y="1394775"/>
+                <a:ext cx="360040" cy="396044"/>
+              </a:xfrm>
+              <a:prstGeom prst="arc">
+                <a:avLst>
+                  <a:gd name="adj1" fmla="val 15538480"/>
+                  <a:gd name="adj2" fmla="val 5376446"/>
+                </a:avLst>
+              </a:prstGeom>
+              <a:ln w="19050">
+                <a:solidFill>
+                  <a:schemeClr val="tx1"/>
+                </a:solidFill>
+              </a:ln>
+            </p:spPr>
+            <p:style>
+              <a:lnRef idx="1">
+                <a:schemeClr val="accent1"/>
+              </a:lnRef>
+              <a:fillRef idx="0">
+                <a:schemeClr val="accent1"/>
+              </a:fillRef>
+              <a:effectRef idx="0">
+                <a:schemeClr val="accent1"/>
+              </a:effectRef>
+              <a:fontRef idx="minor">
+                <a:schemeClr val="tx1"/>
+              </a:fontRef>
+            </p:style>
+            <p:txBody>
+              <a:bodyPr rtlCol="0" anchor="ctr"/>
+              <a:lstStyle/>
+              <a:p>
+                <a:pPr algn="ctr"/>
+                <a:endParaRPr lang="de-DE" dirty="0"/>
+              </a:p>
+            </p:txBody>
+          </p:sp>
+          <p:sp>
+            <p:nvSpPr>
+              <p:cNvPr id="65" name="Bogen 64"/>
+              <p:cNvSpPr/>
+              <p:nvPr/>
+            </p:nvSpPr>
+            <p:spPr>
+              <a:xfrm rot="11021761" flipH="1" flipV="1">
+                <a:off x="3288246" y="1784010"/>
+                <a:ext cx="360040" cy="396044"/>
+              </a:xfrm>
+              <a:prstGeom prst="arc">
+                <a:avLst>
+                  <a:gd name="adj1" fmla="val 15538480"/>
+                  <a:gd name="adj2" fmla="val 5376446"/>
+                </a:avLst>
+              </a:prstGeom>
+              <a:ln w="19050">
+                <a:solidFill>
+                  <a:schemeClr val="tx1"/>
+                </a:solidFill>
+              </a:ln>
+            </p:spPr>
+            <p:style>
+              <a:lnRef idx="1">
+                <a:schemeClr val="accent1"/>
+              </a:lnRef>
+              <a:fillRef idx="0">
+                <a:schemeClr val="accent1"/>
+              </a:fillRef>
+              <a:effectRef idx="0">
+                <a:schemeClr val="accent1"/>
+              </a:effectRef>
+              <a:fontRef idx="minor">
+                <a:schemeClr val="tx1"/>
+              </a:fontRef>
+            </p:style>
+            <p:txBody>
+              <a:bodyPr rtlCol="0" anchor="ctr"/>
+              <a:lstStyle/>
+              <a:p>
+                <a:pPr algn="ctr"/>
+                <a:endParaRPr lang="de-DE" dirty="0"/>
+              </a:p>
+            </p:txBody>
+          </p:sp>
+          <p:sp>
+            <p:nvSpPr>
+              <p:cNvPr id="66" name="Bogen 65"/>
+              <p:cNvSpPr/>
+              <p:nvPr/>
+            </p:nvSpPr>
+            <p:spPr>
+              <a:xfrm rot="11021761" flipH="1" flipV="1">
+                <a:off x="3288247" y="2170945"/>
+                <a:ext cx="360040" cy="396044"/>
+              </a:xfrm>
+              <a:prstGeom prst="arc">
+                <a:avLst>
+                  <a:gd name="adj1" fmla="val 15538480"/>
+                  <a:gd name="adj2" fmla="val 5376446"/>
+                </a:avLst>
+              </a:prstGeom>
+              <a:ln w="19050">
+                <a:solidFill>
+                  <a:schemeClr val="tx1"/>
+                </a:solidFill>
+              </a:ln>
+            </p:spPr>
+            <p:style>
+              <a:lnRef idx="1">
+                <a:schemeClr val="accent1"/>
+              </a:lnRef>
+              <a:fillRef idx="0">
+                <a:schemeClr val="accent1"/>
+              </a:fillRef>
+              <a:effectRef idx="0">
+                <a:schemeClr val="accent1"/>
+              </a:effectRef>
+              <a:fontRef idx="minor">
+                <a:schemeClr val="tx1"/>
+              </a:fontRef>
+            </p:style>
+            <p:txBody>
+              <a:bodyPr rtlCol="0" anchor="ctr"/>
+              <a:lstStyle/>
+              <a:p>
+                <a:pPr algn="ctr"/>
+                <a:endParaRPr lang="de-DE" dirty="0"/>
+              </a:p>
+            </p:txBody>
+          </p:sp>
+          <p:sp>
+            <p:nvSpPr>
+              <p:cNvPr id="67" name="Bogen 66"/>
+              <p:cNvSpPr/>
+              <p:nvPr/>
+            </p:nvSpPr>
+            <p:spPr>
+              <a:xfrm rot="11021761" flipH="1" flipV="1">
+                <a:off x="3288247" y="2576097"/>
+                <a:ext cx="360040" cy="396044"/>
+              </a:xfrm>
+              <a:prstGeom prst="arc">
+                <a:avLst>
+                  <a:gd name="adj1" fmla="val 15538480"/>
+                  <a:gd name="adj2" fmla="val 5376446"/>
+                </a:avLst>
+              </a:prstGeom>
+              <a:ln w="19050">
+                <a:solidFill>
+                  <a:schemeClr val="tx1"/>
+                </a:solidFill>
+              </a:ln>
+            </p:spPr>
+            <p:style>
+              <a:lnRef idx="1">
+                <a:schemeClr val="accent1"/>
+              </a:lnRef>
+              <a:fillRef idx="0">
+                <a:schemeClr val="accent1"/>
+              </a:fillRef>
+              <a:effectRef idx="0">
+                <a:schemeClr val="accent1"/>
+              </a:effectRef>
+              <a:fontRef idx="minor">
+                <a:schemeClr val="tx1"/>
+              </a:fontRef>
+            </p:style>
+            <p:txBody>
+              <a:bodyPr rtlCol="0" anchor="ctr"/>
+              <a:lstStyle/>
+              <a:p>
+                <a:pPr algn="ctr"/>
+                <a:endParaRPr lang="de-DE" dirty="0"/>
+              </a:p>
+            </p:txBody>
+          </p:sp>
+        </p:grpSp>
         <p:cxnSp>
           <p:nvCxnSpPr>
-            <p:cNvPr id="36" name="Gerade Verbindung 35"/>
+            <p:cNvPr id="62" name="Gerade Verbindung 61"/>
             <p:cNvCxnSpPr/>
             <p:nvPr/>
           </p:nvCxnSpPr>
           <p:spPr>
             <a:xfrm>
-              <a:off x="1979712" y="3717032"/>
-              <a:ext cx="576064" cy="0"/>
+              <a:off x="2492733" y="908720"/>
+              <a:ext cx="781" cy="157891"/>
             </a:xfrm>
             <a:prstGeom prst="line">
               <a:avLst/>
             </a:prstGeom>
-            <a:ln w="57150">
+            <a:ln w="19050">
               <a:solidFill>
                 <a:schemeClr val="tx1"/>
               </a:solidFill>
+              <a:headEnd type="none" w="med" len="med"/>
+              <a:tailEnd type="none" w="med" len="med"/>
             </a:ln>
           </p:spPr>
           <p:style>
@@ -4275,57 +4369,24 @@
         </p:cxnSp>
         <p:cxnSp>
           <p:nvCxnSpPr>
-            <p:cNvPr id="37" name="Gerade Verbindung 36"/>
+            <p:cNvPr id="63" name="Gerade Verbindung 62"/>
             <p:cNvCxnSpPr/>
             <p:nvPr/>
           </p:nvCxnSpPr>
           <p:spPr>
             <a:xfrm>
-              <a:off x="2051720" y="3789040"/>
-              <a:ext cx="432048" cy="0"/>
+              <a:off x="2501698" y="1484784"/>
+              <a:ext cx="0" cy="144016"/>
             </a:xfrm>
             <a:prstGeom prst="line">
               <a:avLst/>
             </a:prstGeom>
-            <a:ln w="57150">
+            <a:ln w="19050">
               <a:solidFill>
                 <a:schemeClr val="tx1"/>
               </a:solidFill>
-            </a:ln>
-          </p:spPr>
-          <p:style>
-            <a:lnRef idx="1">
-              <a:schemeClr val="accent1"/>
-            </a:lnRef>
-            <a:fillRef idx="0">
-              <a:schemeClr val="accent1"/>
-            </a:fillRef>
-            <a:effectRef idx="0">
-              <a:schemeClr val="accent1"/>
-            </a:effectRef>
-            <a:fontRef idx="minor">
-              <a:schemeClr val="tx1"/>
-            </a:fontRef>
-          </p:style>
-        </p:cxnSp>
-        <p:cxnSp>
-          <p:nvCxnSpPr>
-            <p:cNvPr id="38" name="Gerade Verbindung 37"/>
-            <p:cNvCxnSpPr/>
-            <p:nvPr/>
-          </p:nvCxnSpPr>
-          <p:spPr>
-            <a:xfrm>
-              <a:off x="2123728" y="3861048"/>
-              <a:ext cx="288032" cy="0"/>
-            </a:xfrm>
-            <a:prstGeom prst="line">
-              <a:avLst/>
-            </a:prstGeom>
-            <a:ln w="57150">
-              <a:solidFill>
-                <a:schemeClr val="tx1"/>
-              </a:solidFill>
+              <a:headEnd type="none" w="med" len="med"/>
+              <a:tailEnd type="none" w="med" len="med"/>
             </a:ln>
           </p:spPr>
           <p:style>
@@ -4344,181 +4405,24 @@
           </p:style>
         </p:cxnSp>
       </p:grpSp>
-      <p:sp>
-        <p:nvSpPr>
-          <p:cNvPr id="30" name="Ellipse 29"/>
-          <p:cNvSpPr/>
+      <p:cxnSp>
+        <p:nvCxnSpPr>
+          <p:cNvPr id="69" name="Gerade Verbindung 68"/>
+          <p:cNvCxnSpPr/>
           <p:nvPr/>
-        </p:nvSpPr>
+        </p:nvCxnSpPr>
         <p:spPr>
           <a:xfrm>
-            <a:off x="3275856" y="1844824"/>
-            <a:ext cx="432048" cy="432048"/>
-          </a:xfrm>
-          <a:prstGeom prst="ellipse">
+            <a:off x="1763688" y="3284984"/>
+            <a:ext cx="1008112" cy="0"/>
+          </a:xfrm>
+          <a:prstGeom prst="line">
             <a:avLst/>
           </a:prstGeom>
-          <a:solidFill>
-            <a:schemeClr val="bg1"/>
-          </a:solidFill>
-          <a:ln>
+          <a:ln w="19050">
             <a:solidFill>
               <a:schemeClr val="tx1"/>
             </a:solidFill>
-          </a:ln>
-        </p:spPr>
-        <p:style>
-          <a:lnRef idx="2">
-            <a:schemeClr val="accent1">
-              <a:shade val="50000"/>
-            </a:schemeClr>
-          </a:lnRef>
-          <a:fillRef idx="1">
-            <a:schemeClr val="accent1"/>
-          </a:fillRef>
-          <a:effectRef idx="0">
-            <a:schemeClr val="accent1"/>
-          </a:effectRef>
-          <a:fontRef idx="minor">
-            <a:schemeClr val="lt1"/>
-          </a:fontRef>
-        </p:style>
-        <p:txBody>
-          <a:bodyPr rtlCol="0" anchor="ctr"/>
-          <a:lstStyle/>
-          <a:p>
-            <a:pPr algn="ctr"/>
-            <a:r>
-              <a:rPr lang="de-DE" i="1" dirty="0" smtClean="0">
-                <a:solidFill>
-                  <a:schemeClr val="tx1"/>
-                </a:solidFill>
-                <a:latin typeface="Times New Roman" pitchFamily="18" charset="0"/>
-                <a:cs typeface="Times New Roman" pitchFamily="18" charset="0"/>
-              </a:rPr>
-              <a:t>V</a:t>
-            </a:r>
-            <a:endParaRPr lang="de-DE" i="1" dirty="0">
-              <a:solidFill>
-                <a:schemeClr val="tx1"/>
-              </a:solidFill>
-              <a:latin typeface="Times New Roman" pitchFamily="18" charset="0"/>
-              <a:cs typeface="Times New Roman" pitchFamily="18" charset="0"/>
-            </a:endParaRPr>
-          </a:p>
-        </p:txBody>
-      </p:sp>
-      <p:sp>
-        <p:nvSpPr>
-          <p:cNvPr id="42" name="Textfeld 41"/>
-          <p:cNvSpPr txBox="1"/>
-          <p:nvPr/>
-        </p:nvSpPr>
-        <p:spPr>
-          <a:xfrm>
-            <a:off x="1907704" y="2132856"/>
-            <a:ext cx="385042" cy="369332"/>
-          </a:xfrm>
-          <a:prstGeom prst="rect">
-            <a:avLst/>
-          </a:prstGeom>
-          <a:noFill/>
-        </p:spPr>
-        <p:txBody>
-          <a:bodyPr wrap="none" rtlCol="0">
-            <a:spAutoFit/>
-          </a:bodyPr>
-          <a:lstStyle/>
-          <a:p>
-            <a:r>
-              <a:rPr lang="de-DE" i="1" dirty="0" smtClean="0">
-                <a:latin typeface="Times New Roman" pitchFamily="18" charset="0"/>
-                <a:cs typeface="Times New Roman" pitchFamily="18" charset="0"/>
-              </a:rPr>
-              <a:t>q</a:t>
-            </a:r>
-            <a:r>
-              <a:rPr lang="de-DE" i="1" baseline="-25000" dirty="0" smtClean="0">
-                <a:latin typeface="Times New Roman" pitchFamily="18" charset="0"/>
-                <a:cs typeface="Times New Roman" pitchFamily="18" charset="0"/>
-              </a:rPr>
-              <a:t>1</a:t>
-            </a:r>
-            <a:endParaRPr lang="de-DE" i="1" baseline="-25000" dirty="0">
-              <a:latin typeface="Times New Roman" pitchFamily="18" charset="0"/>
-              <a:cs typeface="Times New Roman" pitchFamily="18" charset="0"/>
-            </a:endParaRPr>
-          </a:p>
-        </p:txBody>
-      </p:sp>
-      <p:sp>
-        <p:nvSpPr>
-          <p:cNvPr id="43" name="Textfeld 42"/>
-          <p:cNvSpPr txBox="1"/>
-          <p:nvPr/>
-        </p:nvSpPr>
-        <p:spPr>
-          <a:xfrm>
-            <a:off x="2093918" y="2636912"/>
-            <a:ext cx="389850" cy="369332"/>
-          </a:xfrm>
-          <a:prstGeom prst="rect">
-            <a:avLst/>
-          </a:prstGeom>
-          <a:noFill/>
-        </p:spPr>
-        <p:txBody>
-          <a:bodyPr wrap="none" rtlCol="0">
-            <a:spAutoFit/>
-          </a:bodyPr>
-          <a:lstStyle/>
-          <a:p>
-            <a:r>
-              <a:rPr lang="el-GR" i="1" dirty="0" smtClean="0">
-                <a:latin typeface="Times New Roman"/>
-                <a:cs typeface="Times New Roman"/>
-              </a:rPr>
-              <a:t>φ</a:t>
-            </a:r>
-            <a:r>
-              <a:rPr lang="de-DE" i="1" baseline="-25000" dirty="0" smtClean="0">
-                <a:latin typeface="Times New Roman" pitchFamily="18" charset="0"/>
-                <a:cs typeface="Times New Roman" pitchFamily="18" charset="0"/>
-              </a:rPr>
-              <a:t>1</a:t>
-            </a:r>
-            <a:endParaRPr lang="de-DE" i="1" baseline="-25000" dirty="0">
-              <a:latin typeface="Times New Roman" pitchFamily="18" charset="0"/>
-              <a:cs typeface="Times New Roman" pitchFamily="18" charset="0"/>
-            </a:endParaRPr>
-          </a:p>
-        </p:txBody>
-      </p:sp>
-      <p:sp>
-        <p:nvSpPr>
-          <p:cNvPr id="44" name="Bogen 43"/>
-          <p:cNvSpPr/>
-          <p:nvPr/>
-        </p:nvSpPr>
-        <p:spPr>
-          <a:xfrm>
-            <a:off x="2051720" y="2636912"/>
-            <a:ext cx="432048" cy="504056"/>
-          </a:xfrm>
-          <a:prstGeom prst="arc">
-            <a:avLst>
-              <a:gd name="adj1" fmla="val 16200000"/>
-              <a:gd name="adj2" fmla="val 13071486"/>
-            </a:avLst>
-          </a:prstGeom>
-          <a:ln w="38100">
-            <a:solidFill>
-              <a:schemeClr val="bg1">
-                <a:lumMod val="50000"/>
-              </a:schemeClr>
-            </a:solidFill>
-            <a:headEnd type="none" w="med" len="med"/>
-            <a:tailEnd type="triangle" w="med" len="med"/>
           </a:ln>
         </p:spPr>
         <p:style>
@@ -4535,25 +4439,367 @@
             <a:schemeClr val="tx1"/>
           </a:fontRef>
         </p:style>
-        <p:txBody>
-          <a:bodyPr rtlCol="0" anchor="ctr"/>
-          <a:lstStyle/>
-          <a:p>
-            <a:pPr algn="ctr"/>
-            <a:endParaRPr lang="de-DE"/>
-          </a:p>
-        </p:txBody>
-      </p:sp>
-      <p:sp>
-        <p:nvSpPr>
-          <p:cNvPr id="45" name="Textfeld 44"/>
+      </p:cxnSp>
+      <p:cxnSp>
+        <p:nvCxnSpPr>
+          <p:cNvPr id="71" name="Gerade Verbindung 70"/>
+          <p:cNvCxnSpPr/>
+          <p:nvPr/>
+        </p:nvCxnSpPr>
+        <p:spPr>
+          <a:xfrm flipV="1">
+            <a:off x="2771800" y="2942874"/>
+            <a:ext cx="0" cy="342110"/>
+          </a:xfrm>
+          <a:prstGeom prst="line">
+            <a:avLst/>
+          </a:prstGeom>
+          <a:ln w="19050">
+            <a:solidFill>
+              <a:schemeClr val="tx1"/>
+            </a:solidFill>
+          </a:ln>
+        </p:spPr>
+        <p:style>
+          <a:lnRef idx="1">
+            <a:schemeClr val="accent1"/>
+          </a:lnRef>
+          <a:fillRef idx="0">
+            <a:schemeClr val="accent1"/>
+          </a:fillRef>
+          <a:effectRef idx="0">
+            <a:schemeClr val="accent1"/>
+          </a:effectRef>
+          <a:fontRef idx="minor">
+            <a:schemeClr val="tx1"/>
+          </a:fontRef>
+        </p:style>
+      </p:cxnSp>
+      <p:cxnSp>
+        <p:nvCxnSpPr>
+          <p:cNvPr id="73" name="Gerade Verbindung 72"/>
+          <p:cNvCxnSpPr/>
+          <p:nvPr/>
+        </p:nvCxnSpPr>
+        <p:spPr>
+          <a:xfrm flipV="1">
+            <a:off x="2771800" y="2492896"/>
+            <a:ext cx="0" cy="305962"/>
+          </a:xfrm>
+          <a:prstGeom prst="line">
+            <a:avLst/>
+          </a:prstGeom>
+          <a:ln w="19050">
+            <a:solidFill>
+              <a:schemeClr val="tx1"/>
+            </a:solidFill>
+          </a:ln>
+        </p:spPr>
+        <p:style>
+          <a:lnRef idx="1">
+            <a:schemeClr val="accent1"/>
+          </a:lnRef>
+          <a:fillRef idx="0">
+            <a:schemeClr val="accent1"/>
+          </a:fillRef>
+          <a:effectRef idx="0">
+            <a:schemeClr val="accent1"/>
+          </a:effectRef>
+          <a:fontRef idx="minor">
+            <a:schemeClr val="tx1"/>
+          </a:fontRef>
+        </p:style>
+      </p:cxnSp>
+      <p:cxnSp>
+        <p:nvCxnSpPr>
+          <p:cNvPr id="75" name="Gerade Verbindung 74"/>
+          <p:cNvCxnSpPr/>
+          <p:nvPr/>
+        </p:nvCxnSpPr>
+        <p:spPr>
+          <a:xfrm flipH="1">
+            <a:off x="1763688" y="2492896"/>
+            <a:ext cx="1008112" cy="0"/>
+          </a:xfrm>
+          <a:prstGeom prst="line">
+            <a:avLst/>
+          </a:prstGeom>
+          <a:ln w="19050">
+            <a:solidFill>
+              <a:schemeClr val="tx1"/>
+            </a:solidFill>
+          </a:ln>
+        </p:spPr>
+        <p:style>
+          <a:lnRef idx="1">
+            <a:schemeClr val="accent1"/>
+          </a:lnRef>
+          <a:fillRef idx="0">
+            <a:schemeClr val="accent1"/>
+          </a:fillRef>
+          <a:effectRef idx="0">
+            <a:schemeClr val="accent1"/>
+          </a:effectRef>
+          <a:fontRef idx="minor">
+            <a:schemeClr val="tx1"/>
+          </a:fontRef>
+        </p:style>
+      </p:cxnSp>
+      <p:cxnSp>
+        <p:nvCxnSpPr>
+          <p:cNvPr id="77" name="Gerade Verbindung 76"/>
+          <p:cNvCxnSpPr/>
+          <p:nvPr/>
+        </p:nvCxnSpPr>
+        <p:spPr>
+          <a:xfrm flipV="1">
+            <a:off x="1763688" y="3212976"/>
+            <a:ext cx="0" cy="72008"/>
+          </a:xfrm>
+          <a:prstGeom prst="line">
+            <a:avLst/>
+          </a:prstGeom>
+          <a:ln w="19050">
+            <a:solidFill>
+              <a:schemeClr val="tx1"/>
+            </a:solidFill>
+          </a:ln>
+        </p:spPr>
+        <p:style>
+          <a:lnRef idx="1">
+            <a:schemeClr val="accent1"/>
+          </a:lnRef>
+          <a:fillRef idx="0">
+            <a:schemeClr val="accent1"/>
+          </a:fillRef>
+          <a:effectRef idx="0">
+            <a:schemeClr val="accent1"/>
+          </a:effectRef>
+          <a:fontRef idx="minor">
+            <a:schemeClr val="tx1"/>
+          </a:fontRef>
+        </p:style>
+      </p:cxnSp>
+      <p:cxnSp>
+        <p:nvCxnSpPr>
+          <p:cNvPr id="78" name="Gerade Verbindung 77"/>
+          <p:cNvCxnSpPr/>
+          <p:nvPr/>
+        </p:nvCxnSpPr>
+        <p:spPr>
+          <a:xfrm>
+            <a:off x="3419872" y="3717032"/>
+            <a:ext cx="432048" cy="0"/>
+          </a:xfrm>
+          <a:prstGeom prst="line">
+            <a:avLst/>
+          </a:prstGeom>
+          <a:ln w="19050">
+            <a:solidFill>
+              <a:schemeClr val="tx1"/>
+            </a:solidFill>
+          </a:ln>
+        </p:spPr>
+        <p:style>
+          <a:lnRef idx="1">
+            <a:schemeClr val="accent1"/>
+          </a:lnRef>
+          <a:fillRef idx="0">
+            <a:schemeClr val="accent1"/>
+          </a:fillRef>
+          <a:effectRef idx="0">
+            <a:schemeClr val="accent1"/>
+          </a:effectRef>
+          <a:fontRef idx="minor">
+            <a:schemeClr val="tx1"/>
+          </a:fontRef>
+        </p:style>
+      </p:cxnSp>
+      <p:cxnSp>
+        <p:nvCxnSpPr>
+          <p:cNvPr id="79" name="Gerade Verbindung 78"/>
+          <p:cNvCxnSpPr/>
+          <p:nvPr/>
+        </p:nvCxnSpPr>
+        <p:spPr>
+          <a:xfrm flipH="1">
+            <a:off x="3491880" y="3789040"/>
+            <a:ext cx="288032" cy="0"/>
+          </a:xfrm>
+          <a:prstGeom prst="line">
+            <a:avLst/>
+          </a:prstGeom>
+          <a:ln w="19050">
+            <a:solidFill>
+              <a:schemeClr val="tx1"/>
+            </a:solidFill>
+          </a:ln>
+        </p:spPr>
+        <p:style>
+          <a:lnRef idx="1">
+            <a:schemeClr val="accent1"/>
+          </a:lnRef>
+          <a:fillRef idx="0">
+            <a:schemeClr val="accent1"/>
+          </a:fillRef>
+          <a:effectRef idx="0">
+            <a:schemeClr val="accent1"/>
+          </a:effectRef>
+          <a:fontRef idx="minor">
+            <a:schemeClr val="tx1"/>
+          </a:fontRef>
+        </p:style>
+      </p:cxnSp>
+      <p:cxnSp>
+        <p:nvCxnSpPr>
+          <p:cNvPr id="80" name="Gerade Verbindung 79"/>
+          <p:cNvCxnSpPr/>
+          <p:nvPr/>
+        </p:nvCxnSpPr>
+        <p:spPr>
+          <a:xfrm flipH="1">
+            <a:off x="3563888" y="3861048"/>
+            <a:ext cx="144016" cy="0"/>
+          </a:xfrm>
+          <a:prstGeom prst="line">
+            <a:avLst/>
+          </a:prstGeom>
+          <a:ln w="19050">
+            <a:solidFill>
+              <a:schemeClr val="tx1"/>
+            </a:solidFill>
+          </a:ln>
+        </p:spPr>
+        <p:style>
+          <a:lnRef idx="1">
+            <a:schemeClr val="accent1"/>
+          </a:lnRef>
+          <a:fillRef idx="0">
+            <a:schemeClr val="accent1"/>
+          </a:fillRef>
+          <a:effectRef idx="0">
+            <a:schemeClr val="accent1"/>
+          </a:effectRef>
+          <a:fontRef idx="minor">
+            <a:schemeClr val="tx1"/>
+          </a:fontRef>
+        </p:style>
+      </p:cxnSp>
+      <p:cxnSp>
+        <p:nvCxnSpPr>
+          <p:cNvPr id="81" name="Gerade Verbindung 80"/>
+          <p:cNvCxnSpPr/>
+          <p:nvPr/>
+        </p:nvCxnSpPr>
+        <p:spPr>
+          <a:xfrm>
+            <a:off x="2051720" y="3717032"/>
+            <a:ext cx="432048" cy="0"/>
+          </a:xfrm>
+          <a:prstGeom prst="line">
+            <a:avLst/>
+          </a:prstGeom>
+          <a:ln w="19050">
+            <a:solidFill>
+              <a:schemeClr val="tx1"/>
+            </a:solidFill>
+          </a:ln>
+        </p:spPr>
+        <p:style>
+          <a:lnRef idx="1">
+            <a:schemeClr val="accent1"/>
+          </a:lnRef>
+          <a:fillRef idx="0">
+            <a:schemeClr val="accent1"/>
+          </a:fillRef>
+          <a:effectRef idx="0">
+            <a:schemeClr val="accent1"/>
+          </a:effectRef>
+          <a:fontRef idx="minor">
+            <a:schemeClr val="tx1"/>
+          </a:fontRef>
+        </p:style>
+      </p:cxnSp>
+      <p:cxnSp>
+        <p:nvCxnSpPr>
+          <p:cNvPr id="82" name="Gerade Verbindung 81"/>
+          <p:cNvCxnSpPr/>
+          <p:nvPr/>
+        </p:nvCxnSpPr>
+        <p:spPr>
+          <a:xfrm flipH="1">
+            <a:off x="2123728" y="3789040"/>
+            <a:ext cx="288032" cy="0"/>
+          </a:xfrm>
+          <a:prstGeom prst="line">
+            <a:avLst/>
+          </a:prstGeom>
+          <a:ln w="19050">
+            <a:solidFill>
+              <a:schemeClr val="tx1"/>
+            </a:solidFill>
+          </a:ln>
+        </p:spPr>
+        <p:style>
+          <a:lnRef idx="1">
+            <a:schemeClr val="accent1"/>
+          </a:lnRef>
+          <a:fillRef idx="0">
+            <a:schemeClr val="accent1"/>
+          </a:fillRef>
+          <a:effectRef idx="0">
+            <a:schemeClr val="accent1"/>
+          </a:effectRef>
+          <a:fontRef idx="minor">
+            <a:schemeClr val="tx1"/>
+          </a:fontRef>
+        </p:style>
+      </p:cxnSp>
+      <p:cxnSp>
+        <p:nvCxnSpPr>
+          <p:cNvPr id="83" name="Gerade Verbindung 82"/>
+          <p:cNvCxnSpPr/>
+          <p:nvPr/>
+        </p:nvCxnSpPr>
+        <p:spPr>
+          <a:xfrm flipH="1">
+            <a:off x="2195736" y="3861048"/>
+            <a:ext cx="144016" cy="0"/>
+          </a:xfrm>
+          <a:prstGeom prst="line">
+            <a:avLst/>
+          </a:prstGeom>
+          <a:ln w="19050">
+            <a:solidFill>
+              <a:schemeClr val="tx1"/>
+            </a:solidFill>
+          </a:ln>
+        </p:spPr>
+        <p:style>
+          <a:lnRef idx="1">
+            <a:schemeClr val="accent1"/>
+          </a:lnRef>
+          <a:fillRef idx="0">
+            <a:schemeClr val="accent1"/>
+          </a:fillRef>
+          <a:effectRef idx="0">
+            <a:schemeClr val="accent1"/>
+          </a:effectRef>
+          <a:fontRef idx="minor">
+            <a:schemeClr val="tx1"/>
+          </a:fontRef>
+        </p:style>
+      </p:cxnSp>
+      <p:sp>
+        <p:nvSpPr>
+          <p:cNvPr id="86" name="Textfeld 85"/>
           <p:cNvSpPr txBox="1"/>
           <p:nvPr/>
         </p:nvSpPr>
         <p:spPr>
           <a:xfrm>
-            <a:off x="1215759" y="2672772"/>
-            <a:ext cx="394660" cy="369332"/>
+            <a:off x="1967662" y="3212976"/>
+            <a:ext cx="300082" cy="369332"/>
           </a:xfrm>
           <a:prstGeom prst="rect">
             <a:avLst/>
@@ -4571,50 +4817,7 @@
                 <a:latin typeface="Times New Roman" pitchFamily="18" charset="0"/>
                 <a:cs typeface="Times New Roman" pitchFamily="18" charset="0"/>
               </a:rPr>
-              <a:t>E</a:t>
-            </a:r>
-            <a:r>
-              <a:rPr lang="de-DE" i="1" baseline="-25000" dirty="0" smtClean="0">
-                <a:latin typeface="Times New Roman" pitchFamily="18" charset="0"/>
-                <a:cs typeface="Times New Roman" pitchFamily="18" charset="0"/>
-              </a:rPr>
-              <a:t>J</a:t>
-            </a:r>
-            <a:endParaRPr lang="de-DE" i="1" baseline="-25000" dirty="0">
-              <a:latin typeface="Times New Roman" pitchFamily="18" charset="0"/>
-              <a:cs typeface="Times New Roman" pitchFamily="18" charset="0"/>
-            </a:endParaRPr>
-          </a:p>
-        </p:txBody>
-      </p:sp>
-      <p:sp>
-        <p:nvSpPr>
-          <p:cNvPr id="46" name="Textfeld 45"/>
-          <p:cNvSpPr txBox="1"/>
-          <p:nvPr/>
-        </p:nvSpPr>
-        <p:spPr>
-          <a:xfrm>
-            <a:off x="2978859" y="2672733"/>
-            <a:ext cx="338554" cy="369332"/>
-          </a:xfrm>
-          <a:prstGeom prst="rect">
-            <a:avLst/>
-          </a:prstGeom>
-          <a:noFill/>
-        </p:spPr>
-        <p:txBody>
-          <a:bodyPr wrap="none" rtlCol="0">
-            <a:spAutoFit/>
-          </a:bodyPr>
-          <a:lstStyle/>
-          <a:p>
-            <a:r>
-              <a:rPr lang="de-DE" i="1" dirty="0" smtClean="0">
-                <a:latin typeface="Times New Roman" pitchFamily="18" charset="0"/>
-                <a:cs typeface="Times New Roman" pitchFamily="18" charset="0"/>
-              </a:rPr>
-              <a:t>C</a:t>
+              <a:t>0</a:t>
             </a:r>
             <a:endParaRPr lang="de-DE" i="1" baseline="-25000" dirty="0">
               <a:latin typeface="Times New Roman" pitchFamily="18" charset="0"/>

</xml_diff>

<commit_message>
Finished the 2nd-revised version of the theory chapter.
</commit_message>
<xml_diff>
--- a/material/figures/introduction/circuit_elements.pptx
+++ b/material/figures/introduction/circuit_elements.pptx
@@ -290,7 +290,7 @@
             <a:fld id="{5F7A13A3-253F-4613-BFE8-12D242E245DD}" type="datetimeFigureOut">
               <a:rPr lang="de-DE" smtClean="0"/>
               <a:pPr/>
-              <a:t>24.05.2012</a:t>
+              <a:t>12.07.2012</a:t>
             </a:fld>
             <a:endParaRPr lang="de-DE" dirty="0"/>
           </a:p>
@@ -457,7 +457,7 @@
             <a:fld id="{5F7A13A3-253F-4613-BFE8-12D242E245DD}" type="datetimeFigureOut">
               <a:rPr lang="de-DE" smtClean="0"/>
               <a:pPr/>
-              <a:t>24.05.2012</a:t>
+              <a:t>12.07.2012</a:t>
             </a:fld>
             <a:endParaRPr lang="de-DE" dirty="0"/>
           </a:p>
@@ -634,7 +634,7 @@
             <a:fld id="{5F7A13A3-253F-4613-BFE8-12D242E245DD}" type="datetimeFigureOut">
               <a:rPr lang="de-DE" smtClean="0"/>
               <a:pPr/>
-              <a:t>24.05.2012</a:t>
+              <a:t>12.07.2012</a:t>
             </a:fld>
             <a:endParaRPr lang="de-DE" dirty="0"/>
           </a:p>
@@ -801,7 +801,7 @@
             <a:fld id="{5F7A13A3-253F-4613-BFE8-12D242E245DD}" type="datetimeFigureOut">
               <a:rPr lang="de-DE" smtClean="0"/>
               <a:pPr/>
-              <a:t>24.05.2012</a:t>
+              <a:t>12.07.2012</a:t>
             </a:fld>
             <a:endParaRPr lang="de-DE" dirty="0"/>
           </a:p>
@@ -1044,7 +1044,7 @@
             <a:fld id="{5F7A13A3-253F-4613-BFE8-12D242E245DD}" type="datetimeFigureOut">
               <a:rPr lang="de-DE" smtClean="0"/>
               <a:pPr/>
-              <a:t>24.05.2012</a:t>
+              <a:t>12.07.2012</a:t>
             </a:fld>
             <a:endParaRPr lang="de-DE" dirty="0"/>
           </a:p>
@@ -1329,7 +1329,7 @@
             <a:fld id="{5F7A13A3-253F-4613-BFE8-12D242E245DD}" type="datetimeFigureOut">
               <a:rPr lang="de-DE" smtClean="0"/>
               <a:pPr/>
-              <a:t>24.05.2012</a:t>
+              <a:t>12.07.2012</a:t>
             </a:fld>
             <a:endParaRPr lang="de-DE" dirty="0"/>
           </a:p>
@@ -1748,7 +1748,7 @@
             <a:fld id="{5F7A13A3-253F-4613-BFE8-12D242E245DD}" type="datetimeFigureOut">
               <a:rPr lang="de-DE" smtClean="0"/>
               <a:pPr/>
-              <a:t>24.05.2012</a:t>
+              <a:t>12.07.2012</a:t>
             </a:fld>
             <a:endParaRPr lang="de-DE" dirty="0"/>
           </a:p>
@@ -1863,7 +1863,7 @@
             <a:fld id="{5F7A13A3-253F-4613-BFE8-12D242E245DD}" type="datetimeFigureOut">
               <a:rPr lang="de-DE" smtClean="0"/>
               <a:pPr/>
-              <a:t>24.05.2012</a:t>
+              <a:t>12.07.2012</a:t>
             </a:fld>
             <a:endParaRPr lang="de-DE" dirty="0"/>
           </a:p>
@@ -1955,7 +1955,7 @@
             <a:fld id="{5F7A13A3-253F-4613-BFE8-12D242E245DD}" type="datetimeFigureOut">
               <a:rPr lang="de-DE" smtClean="0"/>
               <a:pPr/>
-              <a:t>24.05.2012</a:t>
+              <a:t>12.07.2012</a:t>
             </a:fld>
             <a:endParaRPr lang="de-DE" dirty="0"/>
           </a:p>
@@ -2229,7 +2229,7 @@
             <a:fld id="{5F7A13A3-253F-4613-BFE8-12D242E245DD}" type="datetimeFigureOut">
               <a:rPr lang="de-DE" smtClean="0"/>
               <a:pPr/>
-              <a:t>24.05.2012</a:t>
+              <a:t>12.07.2012</a:t>
             </a:fld>
             <a:endParaRPr lang="de-DE" dirty="0"/>
           </a:p>
@@ -2479,7 +2479,7 @@
             <a:fld id="{5F7A13A3-253F-4613-BFE8-12D242E245DD}" type="datetimeFigureOut">
               <a:rPr lang="de-DE" smtClean="0"/>
               <a:pPr/>
-              <a:t>24.05.2012</a:t>
+              <a:t>12.07.2012</a:t>
             </a:fld>
             <a:endParaRPr lang="de-DE" dirty="0"/>
           </a:p>
@@ -2689,7 +2689,7 @@
             <a:fld id="{5F7A13A3-253F-4613-BFE8-12D242E245DD}" type="datetimeFigureOut">
               <a:rPr lang="de-DE" smtClean="0"/>
               <a:pPr/>
-              <a:t>24.05.2012</a:t>
+              <a:t>12.07.2012</a:t>
             </a:fld>
             <a:endParaRPr lang="de-DE" dirty="0"/>
           </a:p>
@@ -4053,7 +4053,7 @@
         </p:nvSpPr>
         <p:spPr>
           <a:xfrm>
-            <a:off x="1403648" y="2672772"/>
+            <a:off x="1403648" y="2678484"/>
             <a:ext cx="312906" cy="369332"/>
           </a:xfrm>
           <a:prstGeom prst="rect">
@@ -4089,7 +4089,7 @@
         </p:nvSpPr>
         <p:spPr>
           <a:xfrm>
-            <a:off x="3009310" y="2672733"/>
+            <a:off x="3009310" y="2678484"/>
             <a:ext cx="338554" cy="369332"/>
           </a:xfrm>
           <a:prstGeom prst="rect">
@@ -4818,6 +4818,158 @@
                 <a:cs typeface="Times New Roman" pitchFamily="18" charset="0"/>
               </a:rPr>
               <a:t>0</a:t>
+            </a:r>
+            <a:endParaRPr lang="de-DE" i="1" baseline="-25000" dirty="0">
+              <a:latin typeface="Times New Roman" pitchFamily="18" charset="0"/>
+              <a:cs typeface="Times New Roman" pitchFamily="18" charset="0"/>
+            </a:endParaRPr>
+          </a:p>
+        </p:txBody>
+      </p:sp>
+      <p:cxnSp>
+        <p:nvCxnSpPr>
+          <p:cNvPr id="33" name="Gerade Verbindung 32"/>
+          <p:cNvCxnSpPr>
+            <a:endCxn id="86" idx="3"/>
+          </p:cNvCxnSpPr>
+          <p:nvPr/>
+        </p:nvCxnSpPr>
+        <p:spPr>
+          <a:xfrm>
+            <a:off x="2267744" y="2492896"/>
+            <a:ext cx="0" cy="904746"/>
+          </a:xfrm>
+          <a:prstGeom prst="line">
+            <a:avLst/>
+          </a:prstGeom>
+          <a:ln w="19050">
+            <a:solidFill>
+              <a:schemeClr val="tx1"/>
+            </a:solidFill>
+            <a:headEnd type="none" w="med" len="med"/>
+            <a:tailEnd type="none" w="med" len="med"/>
+          </a:ln>
+        </p:spPr>
+        <p:style>
+          <a:lnRef idx="1">
+            <a:schemeClr val="accent1"/>
+          </a:lnRef>
+          <a:fillRef idx="0">
+            <a:schemeClr val="accent1"/>
+          </a:fillRef>
+          <a:effectRef idx="0">
+            <a:schemeClr val="accent1"/>
+          </a:effectRef>
+          <a:fontRef idx="minor">
+            <a:schemeClr val="tx1"/>
+          </a:fontRef>
+        </p:style>
+      </p:cxnSp>
+      <p:cxnSp>
+        <p:nvCxnSpPr>
+          <p:cNvPr id="35" name="Gerade Verbindung 34"/>
+          <p:cNvCxnSpPr/>
+          <p:nvPr/>
+        </p:nvCxnSpPr>
+        <p:spPr>
+          <a:xfrm>
+            <a:off x="2123728" y="2708920"/>
+            <a:ext cx="288032" cy="288032"/>
+          </a:xfrm>
+          <a:prstGeom prst="line">
+            <a:avLst/>
+          </a:prstGeom>
+          <a:ln w="19050">
+            <a:solidFill>
+              <a:schemeClr val="tx1"/>
+            </a:solidFill>
+          </a:ln>
+        </p:spPr>
+        <p:style>
+          <a:lnRef idx="1">
+            <a:schemeClr val="accent1"/>
+          </a:lnRef>
+          <a:fillRef idx="0">
+            <a:schemeClr val="accent1"/>
+          </a:fillRef>
+          <a:effectRef idx="0">
+            <a:schemeClr val="accent1"/>
+          </a:effectRef>
+          <a:fontRef idx="minor">
+            <a:schemeClr val="tx1"/>
+          </a:fontRef>
+        </p:style>
+      </p:cxnSp>
+      <p:cxnSp>
+        <p:nvCxnSpPr>
+          <p:cNvPr id="36" name="Gerade Verbindung 35"/>
+          <p:cNvCxnSpPr/>
+          <p:nvPr/>
+        </p:nvCxnSpPr>
+        <p:spPr>
+          <a:xfrm flipV="1">
+            <a:off x="2123728" y="2708920"/>
+            <a:ext cx="288032" cy="288032"/>
+          </a:xfrm>
+          <a:prstGeom prst="line">
+            <a:avLst/>
+          </a:prstGeom>
+          <a:ln w="19050">
+            <a:solidFill>
+              <a:schemeClr val="tx1"/>
+            </a:solidFill>
+          </a:ln>
+        </p:spPr>
+        <p:style>
+          <a:lnRef idx="1">
+            <a:schemeClr val="accent1"/>
+          </a:lnRef>
+          <a:fillRef idx="0">
+            <a:schemeClr val="accent1"/>
+          </a:fillRef>
+          <a:effectRef idx="0">
+            <a:schemeClr val="accent1"/>
+          </a:effectRef>
+          <a:fontRef idx="minor">
+            <a:schemeClr val="tx1"/>
+          </a:fontRef>
+        </p:style>
+      </p:cxnSp>
+      <p:sp>
+        <p:nvSpPr>
+          <p:cNvPr id="38" name="Textfeld 37"/>
+          <p:cNvSpPr txBox="1"/>
+          <p:nvPr/>
+        </p:nvSpPr>
+        <p:spPr>
+          <a:xfrm>
+            <a:off x="1774260" y="2678484"/>
+            <a:ext cx="394660" cy="369332"/>
+          </a:xfrm>
+          <a:prstGeom prst="rect">
+            <a:avLst/>
+          </a:prstGeom>
+          <a:noFill/>
+        </p:spPr>
+        <p:txBody>
+          <a:bodyPr wrap="none" rtlCol="0">
+            <a:spAutoFit/>
+          </a:bodyPr>
+          <a:lstStyle/>
+          <a:p>
+            <a:r>
+              <a:rPr lang="de-DE" i="1" dirty="0" smtClean="0">
+                <a:latin typeface="Times New Roman" pitchFamily="18" charset="0"/>
+                <a:cs typeface="Times New Roman" pitchFamily="18" charset="0"/>
+              </a:rPr>
+              <a:t>E</a:t>
+            </a:r>
+            <a:r>
+              <a:rPr lang="de-DE" i="1" baseline="-25000" dirty="0" smtClean="0">
+                <a:latin typeface="Times New Roman" pitchFamily="18" charset="0"/>
+                <a:cs typeface="Times New Roman" pitchFamily="18" charset="0"/>
+              </a:rPr>
+              <a:t>J</a:t>
             </a:r>
             <a:endParaRPr lang="de-DE" i="1" baseline="-25000" dirty="0">
               <a:latin typeface="Times New Roman" pitchFamily="18" charset="0"/>

</xml_diff>

<commit_message>
Put Denis' remarks in theory and design chapters, worked on the measurement setup chapter.
</commit_message>
<xml_diff>
--- a/material/figures/introduction/circuit_elements.pptx
+++ b/material/figures/introduction/circuit_elements.pptx
@@ -290,7 +290,7 @@
             <a:fld id="{5F7A13A3-253F-4613-BFE8-12D242E245DD}" type="datetimeFigureOut">
               <a:rPr lang="de-DE" smtClean="0"/>
               <a:pPr/>
-              <a:t>23.07.2012</a:t>
+              <a:t>24.08.2012</a:t>
             </a:fld>
             <a:endParaRPr lang="de-DE" dirty="0"/>
           </a:p>
@@ -457,7 +457,7 @@
             <a:fld id="{5F7A13A3-253F-4613-BFE8-12D242E245DD}" type="datetimeFigureOut">
               <a:rPr lang="de-DE" smtClean="0"/>
               <a:pPr/>
-              <a:t>23.07.2012</a:t>
+              <a:t>24.08.2012</a:t>
             </a:fld>
             <a:endParaRPr lang="de-DE" dirty="0"/>
           </a:p>
@@ -634,7 +634,7 @@
             <a:fld id="{5F7A13A3-253F-4613-BFE8-12D242E245DD}" type="datetimeFigureOut">
               <a:rPr lang="de-DE" smtClean="0"/>
               <a:pPr/>
-              <a:t>23.07.2012</a:t>
+              <a:t>24.08.2012</a:t>
             </a:fld>
             <a:endParaRPr lang="de-DE" dirty="0"/>
           </a:p>
@@ -801,7 +801,7 @@
             <a:fld id="{5F7A13A3-253F-4613-BFE8-12D242E245DD}" type="datetimeFigureOut">
               <a:rPr lang="de-DE" smtClean="0"/>
               <a:pPr/>
-              <a:t>23.07.2012</a:t>
+              <a:t>24.08.2012</a:t>
             </a:fld>
             <a:endParaRPr lang="de-DE" dirty="0"/>
           </a:p>
@@ -1044,7 +1044,7 @@
             <a:fld id="{5F7A13A3-253F-4613-BFE8-12D242E245DD}" type="datetimeFigureOut">
               <a:rPr lang="de-DE" smtClean="0"/>
               <a:pPr/>
-              <a:t>23.07.2012</a:t>
+              <a:t>24.08.2012</a:t>
             </a:fld>
             <a:endParaRPr lang="de-DE" dirty="0"/>
           </a:p>
@@ -1329,7 +1329,7 @@
             <a:fld id="{5F7A13A3-253F-4613-BFE8-12D242E245DD}" type="datetimeFigureOut">
               <a:rPr lang="de-DE" smtClean="0"/>
               <a:pPr/>
-              <a:t>23.07.2012</a:t>
+              <a:t>24.08.2012</a:t>
             </a:fld>
             <a:endParaRPr lang="de-DE" dirty="0"/>
           </a:p>
@@ -1748,7 +1748,7 @@
             <a:fld id="{5F7A13A3-253F-4613-BFE8-12D242E245DD}" type="datetimeFigureOut">
               <a:rPr lang="de-DE" smtClean="0"/>
               <a:pPr/>
-              <a:t>23.07.2012</a:t>
+              <a:t>24.08.2012</a:t>
             </a:fld>
             <a:endParaRPr lang="de-DE" dirty="0"/>
           </a:p>
@@ -1863,7 +1863,7 @@
             <a:fld id="{5F7A13A3-253F-4613-BFE8-12D242E245DD}" type="datetimeFigureOut">
               <a:rPr lang="de-DE" smtClean="0"/>
               <a:pPr/>
-              <a:t>23.07.2012</a:t>
+              <a:t>24.08.2012</a:t>
             </a:fld>
             <a:endParaRPr lang="de-DE" dirty="0"/>
           </a:p>
@@ -1955,7 +1955,7 @@
             <a:fld id="{5F7A13A3-253F-4613-BFE8-12D242E245DD}" type="datetimeFigureOut">
               <a:rPr lang="de-DE" smtClean="0"/>
               <a:pPr/>
-              <a:t>23.07.2012</a:t>
+              <a:t>24.08.2012</a:t>
             </a:fld>
             <a:endParaRPr lang="de-DE" dirty="0"/>
           </a:p>
@@ -2229,7 +2229,7 @@
             <a:fld id="{5F7A13A3-253F-4613-BFE8-12D242E245DD}" type="datetimeFigureOut">
               <a:rPr lang="de-DE" smtClean="0"/>
               <a:pPr/>
-              <a:t>23.07.2012</a:t>
+              <a:t>24.08.2012</a:t>
             </a:fld>
             <a:endParaRPr lang="de-DE" dirty="0"/>
           </a:p>
@@ -2479,7 +2479,7 @@
             <a:fld id="{5F7A13A3-253F-4613-BFE8-12D242E245DD}" type="datetimeFigureOut">
               <a:rPr lang="de-DE" smtClean="0"/>
               <a:pPr/>
-              <a:t>23.07.2012</a:t>
+              <a:t>24.08.2012</a:t>
             </a:fld>
             <a:endParaRPr lang="de-DE" dirty="0"/>
           </a:p>
@@ -2689,7 +2689,7 @@
             <a:fld id="{5F7A13A3-253F-4613-BFE8-12D242E245DD}" type="datetimeFigureOut">
               <a:rPr lang="de-DE" smtClean="0"/>
               <a:pPr/>
-              <a:t>23.07.2012</a:t>
+              <a:t>24.08.2012</a:t>
             </a:fld>
             <a:endParaRPr lang="de-DE" dirty="0"/>
           </a:p>
@@ -3716,6 +3716,43 @@
       </p:grpSpPr>
       <p:cxnSp>
         <p:nvCxnSpPr>
+          <p:cNvPr id="34" name="Gerade Verbindung 33"/>
+          <p:cNvCxnSpPr/>
+          <p:nvPr/>
+        </p:nvCxnSpPr>
+        <p:spPr>
+          <a:xfrm>
+            <a:off x="550124" y="2060848"/>
+            <a:ext cx="0" cy="1665149"/>
+          </a:xfrm>
+          <a:prstGeom prst="line">
+            <a:avLst/>
+          </a:prstGeom>
+          <a:ln w="19050">
+            <a:solidFill>
+              <a:schemeClr val="tx1"/>
+            </a:solidFill>
+            <a:headEnd type="none" w="med" len="med"/>
+            <a:tailEnd type="none" w="med" len="med"/>
+          </a:ln>
+        </p:spPr>
+        <p:style>
+          <a:lnRef idx="1">
+            <a:schemeClr val="accent1"/>
+          </a:lnRef>
+          <a:fillRef idx="0">
+            <a:schemeClr val="accent1"/>
+          </a:fillRef>
+          <a:effectRef idx="0">
+            <a:schemeClr val="accent1"/>
+          </a:effectRef>
+          <a:fontRef idx="minor">
+            <a:schemeClr val="tx1"/>
+          </a:fontRef>
+        </p:style>
+      </p:cxnSp>
+      <p:cxnSp>
+        <p:nvCxnSpPr>
           <p:cNvPr id="33" name="Gerade Verbindung 32"/>
           <p:cNvCxnSpPr/>
           <p:nvPr/>
@@ -3991,107 +4028,6 @@
           </a:fontRef>
         </p:style>
       </p:cxnSp>
-      <p:cxnSp>
-        <p:nvCxnSpPr>
-          <p:cNvPr id="34" name="Gerade Verbindung 33"/>
-          <p:cNvCxnSpPr/>
-          <p:nvPr/>
-        </p:nvCxnSpPr>
-        <p:spPr>
-          <a:xfrm>
-            <a:off x="550124" y="2060848"/>
-            <a:ext cx="0" cy="1665149"/>
-          </a:xfrm>
-          <a:prstGeom prst="line">
-            <a:avLst/>
-          </a:prstGeom>
-          <a:ln w="19050">
-            <a:solidFill>
-              <a:schemeClr val="tx1"/>
-            </a:solidFill>
-            <a:headEnd type="none" w="med" len="med"/>
-            <a:tailEnd type="none" w="med" len="med"/>
-          </a:ln>
-        </p:spPr>
-        <p:style>
-          <a:lnRef idx="1">
-            <a:schemeClr val="accent1"/>
-          </a:lnRef>
-          <a:fillRef idx="0">
-            <a:schemeClr val="accent1"/>
-          </a:fillRef>
-          <a:effectRef idx="0">
-            <a:schemeClr val="accent1"/>
-          </a:effectRef>
-          <a:fontRef idx="minor">
-            <a:schemeClr val="tx1"/>
-          </a:fontRef>
-        </p:style>
-      </p:cxnSp>
-      <p:sp>
-        <p:nvSpPr>
-          <p:cNvPr id="30" name="Ellipse 29"/>
-          <p:cNvSpPr/>
-          <p:nvPr/>
-        </p:nvSpPr>
-        <p:spPr>
-          <a:xfrm>
-            <a:off x="827584" y="1844824"/>
-            <a:ext cx="432048" cy="432048"/>
-          </a:xfrm>
-          <a:prstGeom prst="ellipse">
-            <a:avLst/>
-          </a:prstGeom>
-          <a:solidFill>
-            <a:schemeClr val="bg1"/>
-          </a:solidFill>
-          <a:ln w="19050">
-            <a:solidFill>
-              <a:schemeClr val="tx1"/>
-            </a:solidFill>
-          </a:ln>
-        </p:spPr>
-        <p:style>
-          <a:lnRef idx="2">
-            <a:schemeClr val="accent1">
-              <a:shade val="50000"/>
-            </a:schemeClr>
-          </a:lnRef>
-          <a:fillRef idx="1">
-            <a:schemeClr val="accent1"/>
-          </a:fillRef>
-          <a:effectRef idx="0">
-            <a:schemeClr val="accent1"/>
-          </a:effectRef>
-          <a:fontRef idx="minor">
-            <a:schemeClr val="lt1"/>
-          </a:fontRef>
-        </p:style>
-        <p:txBody>
-          <a:bodyPr rtlCol="0" anchor="ctr"/>
-          <a:lstStyle/>
-          <a:p>
-            <a:pPr algn="r"/>
-            <a:r>
-              <a:rPr lang="de-DE" i="1" dirty="0" smtClean="0">
-                <a:solidFill>
-                  <a:schemeClr val="tx1"/>
-                </a:solidFill>
-                <a:latin typeface="Times New Roman" pitchFamily="18" charset="0"/>
-                <a:cs typeface="Times New Roman" pitchFamily="18" charset="0"/>
-              </a:rPr>
-              <a:t>V</a:t>
-            </a:r>
-            <a:endParaRPr lang="de-DE" i="1" dirty="0">
-              <a:solidFill>
-                <a:schemeClr val="tx1"/>
-              </a:solidFill>
-              <a:latin typeface="Times New Roman" pitchFamily="18" charset="0"/>
-              <a:cs typeface="Times New Roman" pitchFamily="18" charset="0"/>
-            </a:endParaRPr>
-          </a:p>
-        </p:txBody>
-      </p:sp>
       <p:sp>
         <p:nvSpPr>
           <p:cNvPr id="45" name="Textfeld 44"/>
@@ -4117,14 +4053,14 @@
             <a:pPr algn="r"/>
             <a:r>
               <a:rPr lang="de-DE" i="1" dirty="0" smtClean="0">
-                <a:latin typeface="Times New Roman" pitchFamily="18" charset="0"/>
-                <a:cs typeface="Times New Roman" pitchFamily="18" charset="0"/>
+                <a:latin typeface="Arial" pitchFamily="34" charset="0"/>
+                <a:cs typeface="Arial" pitchFamily="34" charset="0"/>
               </a:rPr>
               <a:t>L</a:t>
             </a:r>
             <a:endParaRPr lang="de-DE" i="1" baseline="-25000" dirty="0">
-              <a:latin typeface="Times New Roman" pitchFamily="18" charset="0"/>
-              <a:cs typeface="Times New Roman" pitchFamily="18" charset="0"/>
+              <a:latin typeface="Arial" pitchFamily="34" charset="0"/>
+              <a:cs typeface="Arial" pitchFamily="34" charset="0"/>
             </a:endParaRPr>
           </a:p>
         </p:txBody>
@@ -4137,8 +4073,8 @@
         </p:nvSpPr>
         <p:spPr>
           <a:xfrm>
-            <a:off x="3009310" y="2678484"/>
-            <a:ext cx="338554" cy="369332"/>
+            <a:off x="2996486" y="2678484"/>
+            <a:ext cx="351378" cy="369332"/>
           </a:xfrm>
           <a:prstGeom prst="rect">
             <a:avLst/>
@@ -4154,14 +4090,14 @@
             <a:pPr algn="r"/>
             <a:r>
               <a:rPr lang="de-DE" i="1" dirty="0" smtClean="0">
-                <a:latin typeface="Times New Roman" pitchFamily="18" charset="0"/>
-                <a:cs typeface="Times New Roman" pitchFamily="18" charset="0"/>
+                <a:latin typeface="Arial" pitchFamily="34" charset="0"/>
+                <a:cs typeface="Arial" pitchFamily="34" charset="0"/>
               </a:rPr>
               <a:t>C</a:t>
             </a:r>
             <a:endParaRPr lang="de-DE" i="1" baseline="-25000" dirty="0">
-              <a:latin typeface="Times New Roman" pitchFamily="18" charset="0"/>
-              <a:cs typeface="Times New Roman" pitchFamily="18" charset="0"/>
+              <a:latin typeface="Arial" pitchFamily="34" charset="0"/>
+              <a:cs typeface="Arial" pitchFamily="34" charset="0"/>
             </a:endParaRPr>
           </a:p>
         </p:txBody>
@@ -4993,8 +4929,8 @@
         </p:nvSpPr>
         <p:spPr>
           <a:xfrm>
-            <a:off x="1398362" y="1454348"/>
-            <a:ext cx="458779" cy="369332"/>
+            <a:off x="1387141" y="1454348"/>
+            <a:ext cx="470000" cy="369332"/>
           </a:xfrm>
           <a:prstGeom prst="rect">
             <a:avLst/>
@@ -5010,21 +4946,21 @@
             <a:pPr algn="r"/>
             <a:r>
               <a:rPr lang="de-DE" i="1" dirty="0" err="1" smtClean="0">
-                <a:latin typeface="Times New Roman" pitchFamily="18" charset="0"/>
-                <a:cs typeface="Times New Roman" pitchFamily="18" charset="0"/>
+                <a:latin typeface="Arial" pitchFamily="34" charset="0"/>
+                <a:cs typeface="Arial" pitchFamily="34" charset="0"/>
               </a:rPr>
               <a:t>C</a:t>
             </a:r>
             <a:r>
               <a:rPr lang="de-DE" i="1" baseline="-25000" dirty="0" err="1" smtClean="0">
-                <a:latin typeface="Times New Roman" pitchFamily="18" charset="0"/>
-                <a:cs typeface="Times New Roman" pitchFamily="18" charset="0"/>
+                <a:latin typeface="Arial" pitchFamily="34" charset="0"/>
+                <a:cs typeface="Arial" pitchFamily="34" charset="0"/>
               </a:rPr>
               <a:t>in</a:t>
             </a:r>
             <a:endParaRPr lang="de-DE" i="1" baseline="-25000" dirty="0">
-              <a:latin typeface="Times New Roman" pitchFamily="18" charset="0"/>
-              <a:cs typeface="Times New Roman" pitchFamily="18" charset="0"/>
+              <a:latin typeface="Arial" pitchFamily="34" charset="0"/>
+              <a:cs typeface="Arial" pitchFamily="34" charset="0"/>
             </a:endParaRPr>
           </a:p>
         </p:txBody>
@@ -5420,8 +5356,8 @@
         </p:nvSpPr>
         <p:spPr>
           <a:xfrm>
-            <a:off x="1870006" y="2673914"/>
-            <a:ext cx="325730" cy="369332"/>
+            <a:off x="1844358" y="2673914"/>
+            <a:ext cx="351378" cy="369332"/>
           </a:xfrm>
           <a:prstGeom prst="rect">
             <a:avLst/>
@@ -5437,14 +5373,566 @@
             <a:pPr algn="r"/>
             <a:r>
               <a:rPr lang="de-DE" i="1" dirty="0" smtClean="0">
-                <a:latin typeface="Times New Roman" pitchFamily="18" charset="0"/>
-                <a:cs typeface="Times New Roman" pitchFamily="18" charset="0"/>
+                <a:latin typeface="Arial" pitchFamily="34" charset="0"/>
+                <a:cs typeface="Arial" pitchFamily="34" charset="0"/>
               </a:rPr>
               <a:t>R</a:t>
             </a:r>
             <a:endParaRPr lang="de-DE" i="1" baseline="-25000" dirty="0">
-              <a:latin typeface="Times New Roman" pitchFamily="18" charset="0"/>
-              <a:cs typeface="Times New Roman" pitchFamily="18" charset="0"/>
+              <a:latin typeface="Arial" pitchFamily="34" charset="0"/>
+              <a:cs typeface="Arial" pitchFamily="34" charset="0"/>
+            </a:endParaRPr>
+          </a:p>
+        </p:txBody>
+      </p:sp>
+      <p:grpSp>
+        <p:nvGrpSpPr>
+          <p:cNvPr id="52" name="Gruppieren 51"/>
+          <p:cNvGrpSpPr/>
+          <p:nvPr/>
+        </p:nvGrpSpPr>
+        <p:grpSpPr>
+          <a:xfrm rot="5400000">
+            <a:off x="870519" y="1801889"/>
+            <a:ext cx="144016" cy="517918"/>
+            <a:chOff x="467544" y="2636912"/>
+            <a:chExt cx="144016" cy="517918"/>
+          </a:xfrm>
+        </p:grpSpPr>
+        <p:sp>
+          <p:nvSpPr>
+            <p:cNvPr id="51" name="Rechteck 50"/>
+            <p:cNvSpPr/>
+            <p:nvPr/>
+          </p:nvSpPr>
+          <p:spPr>
+            <a:xfrm>
+              <a:off x="509832" y="2650774"/>
+              <a:ext cx="72008" cy="504056"/>
+            </a:xfrm>
+            <a:prstGeom prst="rect">
+              <a:avLst/>
+            </a:prstGeom>
+            <a:solidFill>
+              <a:schemeClr val="bg1"/>
+            </a:solidFill>
+            <a:ln>
+              <a:noFill/>
+            </a:ln>
+          </p:spPr>
+          <p:style>
+            <a:lnRef idx="2">
+              <a:schemeClr val="accent1">
+                <a:shade val="50000"/>
+              </a:schemeClr>
+            </a:lnRef>
+            <a:fillRef idx="1">
+              <a:schemeClr val="accent1"/>
+            </a:fillRef>
+            <a:effectRef idx="0">
+              <a:schemeClr val="accent1"/>
+            </a:effectRef>
+            <a:fontRef idx="minor">
+              <a:schemeClr val="lt1"/>
+            </a:fontRef>
+          </p:style>
+          <p:txBody>
+            <a:bodyPr rtlCol="0" anchor="ctr"/>
+            <a:lstStyle/>
+            <a:p>
+              <a:pPr algn="ctr"/>
+              <a:endParaRPr lang="de-DE"/>
+            </a:p>
+          </p:txBody>
+        </p:sp>
+        <p:sp>
+          <p:nvSpPr>
+            <p:cNvPr id="42" name="Freihandform 41"/>
+            <p:cNvSpPr/>
+            <p:nvPr/>
+          </p:nvSpPr>
+          <p:spPr>
+            <a:xfrm>
+              <a:off x="467544" y="2636912"/>
+              <a:ext cx="144016" cy="503479"/>
+            </a:xfrm>
+            <a:custGeom>
+              <a:avLst/>
+              <a:gdLst>
+                <a:gd name="connsiteX0" fmla="*/ 110997 w 221994"/>
+                <a:gd name="connsiteY0" fmla="*/ 0 h 486271"/>
+                <a:gd name="connsiteX1" fmla="*/ 221994 w 221994"/>
+                <a:gd name="connsiteY1" fmla="*/ 84569 h 486271"/>
+                <a:gd name="connsiteX2" fmla="*/ 15857 w 221994"/>
+                <a:gd name="connsiteY2" fmla="*/ 179709 h 486271"/>
+                <a:gd name="connsiteX3" fmla="*/ 221994 w 221994"/>
+                <a:gd name="connsiteY3" fmla="*/ 258992 h 486271"/>
+                <a:gd name="connsiteX4" fmla="*/ 31714 w 221994"/>
+                <a:gd name="connsiteY4" fmla="*/ 322419 h 486271"/>
+                <a:gd name="connsiteX5" fmla="*/ 200851 w 221994"/>
+                <a:gd name="connsiteY5" fmla="*/ 396416 h 486271"/>
+                <a:gd name="connsiteX6" fmla="*/ 0 w 221994"/>
+                <a:gd name="connsiteY6" fmla="*/ 449272 h 486271"/>
+                <a:gd name="connsiteX7" fmla="*/ 121568 w 221994"/>
+                <a:gd name="connsiteY7" fmla="*/ 486271 h 486271"/>
+                <a:gd name="connsiteX0" fmla="*/ 110997 w 221994"/>
+                <a:gd name="connsiteY0" fmla="*/ 0 h 576064"/>
+                <a:gd name="connsiteX1" fmla="*/ 221994 w 221994"/>
+                <a:gd name="connsiteY1" fmla="*/ 84569 h 576064"/>
+                <a:gd name="connsiteX2" fmla="*/ 15857 w 221994"/>
+                <a:gd name="connsiteY2" fmla="*/ 179709 h 576064"/>
+                <a:gd name="connsiteX3" fmla="*/ 221994 w 221994"/>
+                <a:gd name="connsiteY3" fmla="*/ 258992 h 576064"/>
+                <a:gd name="connsiteX4" fmla="*/ 31714 w 221994"/>
+                <a:gd name="connsiteY4" fmla="*/ 322419 h 576064"/>
+                <a:gd name="connsiteX5" fmla="*/ 200851 w 221994"/>
+                <a:gd name="connsiteY5" fmla="*/ 396416 h 576064"/>
+                <a:gd name="connsiteX6" fmla="*/ 0 w 221994"/>
+                <a:gd name="connsiteY6" fmla="*/ 449272 h 576064"/>
+                <a:gd name="connsiteX7" fmla="*/ 144016 w 221994"/>
+                <a:gd name="connsiteY7" fmla="*/ 576064 h 576064"/>
+                <a:gd name="connsiteX0" fmla="*/ 110997 w 221994"/>
+                <a:gd name="connsiteY0" fmla="*/ 0 h 576064"/>
+                <a:gd name="connsiteX1" fmla="*/ 221994 w 221994"/>
+                <a:gd name="connsiteY1" fmla="*/ 84569 h 576064"/>
+                <a:gd name="connsiteX2" fmla="*/ 15857 w 221994"/>
+                <a:gd name="connsiteY2" fmla="*/ 179709 h 576064"/>
+                <a:gd name="connsiteX3" fmla="*/ 221994 w 221994"/>
+                <a:gd name="connsiteY3" fmla="*/ 258992 h 576064"/>
+                <a:gd name="connsiteX4" fmla="*/ 31714 w 221994"/>
+                <a:gd name="connsiteY4" fmla="*/ 322419 h 576064"/>
+                <a:gd name="connsiteX5" fmla="*/ 200851 w 221994"/>
+                <a:gd name="connsiteY5" fmla="*/ 396416 h 576064"/>
+                <a:gd name="connsiteX6" fmla="*/ 0 w 221994"/>
+                <a:gd name="connsiteY6" fmla="*/ 504055 h 576064"/>
+                <a:gd name="connsiteX7" fmla="*/ 144016 w 221994"/>
+                <a:gd name="connsiteY7" fmla="*/ 576064 h 576064"/>
+                <a:gd name="connsiteX0" fmla="*/ 110997 w 221994"/>
+                <a:gd name="connsiteY0" fmla="*/ 0 h 576064"/>
+                <a:gd name="connsiteX1" fmla="*/ 221994 w 221994"/>
+                <a:gd name="connsiteY1" fmla="*/ 84569 h 576064"/>
+                <a:gd name="connsiteX2" fmla="*/ 15857 w 221994"/>
+                <a:gd name="connsiteY2" fmla="*/ 179709 h 576064"/>
+                <a:gd name="connsiteX3" fmla="*/ 221994 w 221994"/>
+                <a:gd name="connsiteY3" fmla="*/ 258992 h 576064"/>
+                <a:gd name="connsiteX4" fmla="*/ 31714 w 221994"/>
+                <a:gd name="connsiteY4" fmla="*/ 322419 h 576064"/>
+                <a:gd name="connsiteX5" fmla="*/ 216024 w 221994"/>
+                <a:gd name="connsiteY5" fmla="*/ 432047 h 576064"/>
+                <a:gd name="connsiteX6" fmla="*/ 0 w 221994"/>
+                <a:gd name="connsiteY6" fmla="*/ 504055 h 576064"/>
+                <a:gd name="connsiteX7" fmla="*/ 144016 w 221994"/>
+                <a:gd name="connsiteY7" fmla="*/ 576064 h 576064"/>
+                <a:gd name="connsiteX0" fmla="*/ 110997 w 221994"/>
+                <a:gd name="connsiteY0" fmla="*/ 0 h 576064"/>
+                <a:gd name="connsiteX1" fmla="*/ 221994 w 221994"/>
+                <a:gd name="connsiteY1" fmla="*/ 84569 h 576064"/>
+                <a:gd name="connsiteX2" fmla="*/ 15857 w 221994"/>
+                <a:gd name="connsiteY2" fmla="*/ 179709 h 576064"/>
+                <a:gd name="connsiteX3" fmla="*/ 221994 w 221994"/>
+                <a:gd name="connsiteY3" fmla="*/ 258992 h 576064"/>
+                <a:gd name="connsiteX4" fmla="*/ 0 w 221994"/>
+                <a:gd name="connsiteY4" fmla="*/ 432047 h 576064"/>
+                <a:gd name="connsiteX5" fmla="*/ 31714 w 221994"/>
+                <a:gd name="connsiteY5" fmla="*/ 322419 h 576064"/>
+                <a:gd name="connsiteX6" fmla="*/ 216024 w 221994"/>
+                <a:gd name="connsiteY6" fmla="*/ 432047 h 576064"/>
+                <a:gd name="connsiteX7" fmla="*/ 0 w 221994"/>
+                <a:gd name="connsiteY7" fmla="*/ 504055 h 576064"/>
+                <a:gd name="connsiteX8" fmla="*/ 144016 w 221994"/>
+                <a:gd name="connsiteY8" fmla="*/ 576064 h 576064"/>
+                <a:gd name="connsiteX0" fmla="*/ 110997 w 221994"/>
+                <a:gd name="connsiteY0" fmla="*/ 0 h 576064"/>
+                <a:gd name="connsiteX1" fmla="*/ 221994 w 221994"/>
+                <a:gd name="connsiteY1" fmla="*/ 84569 h 576064"/>
+                <a:gd name="connsiteX2" fmla="*/ 15857 w 221994"/>
+                <a:gd name="connsiteY2" fmla="*/ 179709 h 576064"/>
+                <a:gd name="connsiteX3" fmla="*/ 221994 w 221994"/>
+                <a:gd name="connsiteY3" fmla="*/ 258992 h 576064"/>
+                <a:gd name="connsiteX4" fmla="*/ 0 w 221994"/>
+                <a:gd name="connsiteY4" fmla="*/ 360039 h 576064"/>
+                <a:gd name="connsiteX5" fmla="*/ 31714 w 221994"/>
+                <a:gd name="connsiteY5" fmla="*/ 322419 h 576064"/>
+                <a:gd name="connsiteX6" fmla="*/ 216024 w 221994"/>
+                <a:gd name="connsiteY6" fmla="*/ 432047 h 576064"/>
+                <a:gd name="connsiteX7" fmla="*/ 0 w 221994"/>
+                <a:gd name="connsiteY7" fmla="*/ 504055 h 576064"/>
+                <a:gd name="connsiteX8" fmla="*/ 144016 w 221994"/>
+                <a:gd name="connsiteY8" fmla="*/ 576064 h 576064"/>
+                <a:gd name="connsiteX0" fmla="*/ 110997 w 221994"/>
+                <a:gd name="connsiteY0" fmla="*/ 0 h 576064"/>
+                <a:gd name="connsiteX1" fmla="*/ 221994 w 221994"/>
+                <a:gd name="connsiteY1" fmla="*/ 84569 h 576064"/>
+                <a:gd name="connsiteX2" fmla="*/ 15857 w 221994"/>
+                <a:gd name="connsiteY2" fmla="*/ 179709 h 576064"/>
+                <a:gd name="connsiteX3" fmla="*/ 221994 w 221994"/>
+                <a:gd name="connsiteY3" fmla="*/ 258992 h 576064"/>
+                <a:gd name="connsiteX4" fmla="*/ 31714 w 221994"/>
+                <a:gd name="connsiteY4" fmla="*/ 322419 h 576064"/>
+                <a:gd name="connsiteX5" fmla="*/ 216024 w 221994"/>
+                <a:gd name="connsiteY5" fmla="*/ 432047 h 576064"/>
+                <a:gd name="connsiteX6" fmla="*/ 0 w 221994"/>
+                <a:gd name="connsiteY6" fmla="*/ 504055 h 576064"/>
+                <a:gd name="connsiteX7" fmla="*/ 144016 w 221994"/>
+                <a:gd name="connsiteY7" fmla="*/ 576064 h 576064"/>
+                <a:gd name="connsiteX0" fmla="*/ 110997 w 221994"/>
+                <a:gd name="connsiteY0" fmla="*/ 0 h 576064"/>
+                <a:gd name="connsiteX1" fmla="*/ 221994 w 221994"/>
+                <a:gd name="connsiteY1" fmla="*/ 84569 h 576064"/>
+                <a:gd name="connsiteX2" fmla="*/ 15857 w 221994"/>
+                <a:gd name="connsiteY2" fmla="*/ 179709 h 576064"/>
+                <a:gd name="connsiteX3" fmla="*/ 221994 w 221994"/>
+                <a:gd name="connsiteY3" fmla="*/ 258992 h 576064"/>
+                <a:gd name="connsiteX4" fmla="*/ 0 w 221994"/>
+                <a:gd name="connsiteY4" fmla="*/ 360039 h 576064"/>
+                <a:gd name="connsiteX5" fmla="*/ 216024 w 221994"/>
+                <a:gd name="connsiteY5" fmla="*/ 432047 h 576064"/>
+                <a:gd name="connsiteX6" fmla="*/ 0 w 221994"/>
+                <a:gd name="connsiteY6" fmla="*/ 504055 h 576064"/>
+                <a:gd name="connsiteX7" fmla="*/ 144016 w 221994"/>
+                <a:gd name="connsiteY7" fmla="*/ 576064 h 576064"/>
+                <a:gd name="connsiteX0" fmla="*/ 110997 w 221994"/>
+                <a:gd name="connsiteY0" fmla="*/ 0 h 576064"/>
+                <a:gd name="connsiteX1" fmla="*/ 221994 w 221994"/>
+                <a:gd name="connsiteY1" fmla="*/ 84569 h 576064"/>
+                <a:gd name="connsiteX2" fmla="*/ 15857 w 221994"/>
+                <a:gd name="connsiteY2" fmla="*/ 179709 h 576064"/>
+                <a:gd name="connsiteX3" fmla="*/ 216024 w 221994"/>
+                <a:gd name="connsiteY3" fmla="*/ 288031 h 576064"/>
+                <a:gd name="connsiteX4" fmla="*/ 0 w 221994"/>
+                <a:gd name="connsiteY4" fmla="*/ 360039 h 576064"/>
+                <a:gd name="connsiteX5" fmla="*/ 216024 w 221994"/>
+                <a:gd name="connsiteY5" fmla="*/ 432047 h 576064"/>
+                <a:gd name="connsiteX6" fmla="*/ 0 w 221994"/>
+                <a:gd name="connsiteY6" fmla="*/ 504055 h 576064"/>
+                <a:gd name="connsiteX7" fmla="*/ 144016 w 221994"/>
+                <a:gd name="connsiteY7" fmla="*/ 576064 h 576064"/>
+                <a:gd name="connsiteX0" fmla="*/ 110997 w 221994"/>
+                <a:gd name="connsiteY0" fmla="*/ 0 h 576064"/>
+                <a:gd name="connsiteX1" fmla="*/ 221994 w 221994"/>
+                <a:gd name="connsiteY1" fmla="*/ 84569 h 576064"/>
+                <a:gd name="connsiteX2" fmla="*/ 0 w 221994"/>
+                <a:gd name="connsiteY2" fmla="*/ 216023 h 576064"/>
+                <a:gd name="connsiteX3" fmla="*/ 216024 w 221994"/>
+                <a:gd name="connsiteY3" fmla="*/ 288031 h 576064"/>
+                <a:gd name="connsiteX4" fmla="*/ 0 w 221994"/>
+                <a:gd name="connsiteY4" fmla="*/ 360039 h 576064"/>
+                <a:gd name="connsiteX5" fmla="*/ 216024 w 221994"/>
+                <a:gd name="connsiteY5" fmla="*/ 432047 h 576064"/>
+                <a:gd name="connsiteX6" fmla="*/ 0 w 221994"/>
+                <a:gd name="connsiteY6" fmla="*/ 504055 h 576064"/>
+                <a:gd name="connsiteX7" fmla="*/ 144016 w 221994"/>
+                <a:gd name="connsiteY7" fmla="*/ 576064 h 576064"/>
+                <a:gd name="connsiteX0" fmla="*/ 110997 w 216024"/>
+                <a:gd name="connsiteY0" fmla="*/ 0 h 576064"/>
+                <a:gd name="connsiteX1" fmla="*/ 216024 w 216024"/>
+                <a:gd name="connsiteY1" fmla="*/ 144015 h 576064"/>
+                <a:gd name="connsiteX2" fmla="*/ 0 w 216024"/>
+                <a:gd name="connsiteY2" fmla="*/ 216023 h 576064"/>
+                <a:gd name="connsiteX3" fmla="*/ 216024 w 216024"/>
+                <a:gd name="connsiteY3" fmla="*/ 288031 h 576064"/>
+                <a:gd name="connsiteX4" fmla="*/ 0 w 216024"/>
+                <a:gd name="connsiteY4" fmla="*/ 360039 h 576064"/>
+                <a:gd name="connsiteX5" fmla="*/ 216024 w 216024"/>
+                <a:gd name="connsiteY5" fmla="*/ 432047 h 576064"/>
+                <a:gd name="connsiteX6" fmla="*/ 0 w 216024"/>
+                <a:gd name="connsiteY6" fmla="*/ 504055 h 576064"/>
+                <a:gd name="connsiteX7" fmla="*/ 144016 w 216024"/>
+                <a:gd name="connsiteY7" fmla="*/ 576064 h 576064"/>
+                <a:gd name="connsiteX0" fmla="*/ 72008 w 216024"/>
+                <a:gd name="connsiteY0" fmla="*/ 0 h 504057"/>
+                <a:gd name="connsiteX1" fmla="*/ 216024 w 216024"/>
+                <a:gd name="connsiteY1" fmla="*/ 72008 h 504057"/>
+                <a:gd name="connsiteX2" fmla="*/ 0 w 216024"/>
+                <a:gd name="connsiteY2" fmla="*/ 144016 h 504057"/>
+                <a:gd name="connsiteX3" fmla="*/ 216024 w 216024"/>
+                <a:gd name="connsiteY3" fmla="*/ 216024 h 504057"/>
+                <a:gd name="connsiteX4" fmla="*/ 0 w 216024"/>
+                <a:gd name="connsiteY4" fmla="*/ 288032 h 504057"/>
+                <a:gd name="connsiteX5" fmla="*/ 216024 w 216024"/>
+                <a:gd name="connsiteY5" fmla="*/ 360040 h 504057"/>
+                <a:gd name="connsiteX6" fmla="*/ 0 w 216024"/>
+                <a:gd name="connsiteY6" fmla="*/ 432048 h 504057"/>
+                <a:gd name="connsiteX7" fmla="*/ 144016 w 216024"/>
+                <a:gd name="connsiteY7" fmla="*/ 504057 h 504057"/>
+                <a:gd name="connsiteX0" fmla="*/ 72008 w 216024"/>
+                <a:gd name="connsiteY0" fmla="*/ 0 h 504056"/>
+                <a:gd name="connsiteX1" fmla="*/ 216024 w 216024"/>
+                <a:gd name="connsiteY1" fmla="*/ 72008 h 504056"/>
+                <a:gd name="connsiteX2" fmla="*/ 0 w 216024"/>
+                <a:gd name="connsiteY2" fmla="*/ 144016 h 504056"/>
+                <a:gd name="connsiteX3" fmla="*/ 216024 w 216024"/>
+                <a:gd name="connsiteY3" fmla="*/ 216024 h 504056"/>
+                <a:gd name="connsiteX4" fmla="*/ 0 w 216024"/>
+                <a:gd name="connsiteY4" fmla="*/ 288032 h 504056"/>
+                <a:gd name="connsiteX5" fmla="*/ 216024 w 216024"/>
+                <a:gd name="connsiteY5" fmla="*/ 360040 h 504056"/>
+                <a:gd name="connsiteX6" fmla="*/ 0 w 216024"/>
+                <a:gd name="connsiteY6" fmla="*/ 432048 h 504056"/>
+                <a:gd name="connsiteX7" fmla="*/ 144016 w 216024"/>
+                <a:gd name="connsiteY7" fmla="*/ 504056 h 504056"/>
+                <a:gd name="connsiteX0" fmla="*/ 72008 w 216024"/>
+                <a:gd name="connsiteY0" fmla="*/ 0 h 504056"/>
+                <a:gd name="connsiteX1" fmla="*/ 115941 w 216024"/>
+                <a:gd name="connsiteY1" fmla="*/ 0 h 504056"/>
+                <a:gd name="connsiteX2" fmla="*/ 216024 w 216024"/>
+                <a:gd name="connsiteY2" fmla="*/ 72008 h 504056"/>
+                <a:gd name="connsiteX3" fmla="*/ 0 w 216024"/>
+                <a:gd name="connsiteY3" fmla="*/ 144016 h 504056"/>
+                <a:gd name="connsiteX4" fmla="*/ 216024 w 216024"/>
+                <a:gd name="connsiteY4" fmla="*/ 216024 h 504056"/>
+                <a:gd name="connsiteX5" fmla="*/ 0 w 216024"/>
+                <a:gd name="connsiteY5" fmla="*/ 288032 h 504056"/>
+                <a:gd name="connsiteX6" fmla="*/ 216024 w 216024"/>
+                <a:gd name="connsiteY6" fmla="*/ 360040 h 504056"/>
+                <a:gd name="connsiteX7" fmla="*/ 0 w 216024"/>
+                <a:gd name="connsiteY7" fmla="*/ 432048 h 504056"/>
+                <a:gd name="connsiteX8" fmla="*/ 144016 w 216024"/>
+                <a:gd name="connsiteY8" fmla="*/ 504056 h 504056"/>
+                <a:gd name="connsiteX0" fmla="*/ 72008 w 216024"/>
+                <a:gd name="connsiteY0" fmla="*/ 0 h 504056"/>
+                <a:gd name="connsiteX1" fmla="*/ 115577 w 216024"/>
+                <a:gd name="connsiteY1" fmla="*/ 577 h 504056"/>
+                <a:gd name="connsiteX2" fmla="*/ 216024 w 216024"/>
+                <a:gd name="connsiteY2" fmla="*/ 72008 h 504056"/>
+                <a:gd name="connsiteX3" fmla="*/ 0 w 216024"/>
+                <a:gd name="connsiteY3" fmla="*/ 144016 h 504056"/>
+                <a:gd name="connsiteX4" fmla="*/ 216024 w 216024"/>
+                <a:gd name="connsiteY4" fmla="*/ 216024 h 504056"/>
+                <a:gd name="connsiteX5" fmla="*/ 0 w 216024"/>
+                <a:gd name="connsiteY5" fmla="*/ 288032 h 504056"/>
+                <a:gd name="connsiteX6" fmla="*/ 216024 w 216024"/>
+                <a:gd name="connsiteY6" fmla="*/ 360040 h 504056"/>
+                <a:gd name="connsiteX7" fmla="*/ 0 w 216024"/>
+                <a:gd name="connsiteY7" fmla="*/ 432048 h 504056"/>
+                <a:gd name="connsiteX8" fmla="*/ 144016 w 216024"/>
+                <a:gd name="connsiteY8" fmla="*/ 504056 h 504056"/>
+                <a:gd name="connsiteX0" fmla="*/ 72008 w 216024"/>
+                <a:gd name="connsiteY0" fmla="*/ 0 h 504056"/>
+                <a:gd name="connsiteX1" fmla="*/ 115577 w 216024"/>
+                <a:gd name="connsiteY1" fmla="*/ 577 h 504056"/>
+                <a:gd name="connsiteX2" fmla="*/ 216024 w 216024"/>
+                <a:gd name="connsiteY2" fmla="*/ 72008 h 504056"/>
+                <a:gd name="connsiteX3" fmla="*/ 0 w 216024"/>
+                <a:gd name="connsiteY3" fmla="*/ 144016 h 504056"/>
+                <a:gd name="connsiteX4" fmla="*/ 216024 w 216024"/>
+                <a:gd name="connsiteY4" fmla="*/ 216024 h 504056"/>
+                <a:gd name="connsiteX5" fmla="*/ 0 w 216024"/>
+                <a:gd name="connsiteY5" fmla="*/ 288032 h 504056"/>
+                <a:gd name="connsiteX6" fmla="*/ 216024 w 216024"/>
+                <a:gd name="connsiteY6" fmla="*/ 360040 h 504056"/>
+                <a:gd name="connsiteX7" fmla="*/ 0 w 216024"/>
+                <a:gd name="connsiteY7" fmla="*/ 432048 h 504056"/>
+                <a:gd name="connsiteX8" fmla="*/ 120233 w 216024"/>
+                <a:gd name="connsiteY8" fmla="*/ 504056 h 504056"/>
+                <a:gd name="connsiteX0" fmla="*/ 115577 w 216024"/>
+                <a:gd name="connsiteY0" fmla="*/ 0 h 503479"/>
+                <a:gd name="connsiteX1" fmla="*/ 216024 w 216024"/>
+                <a:gd name="connsiteY1" fmla="*/ 71431 h 503479"/>
+                <a:gd name="connsiteX2" fmla="*/ 0 w 216024"/>
+                <a:gd name="connsiteY2" fmla="*/ 143439 h 503479"/>
+                <a:gd name="connsiteX3" fmla="*/ 216024 w 216024"/>
+                <a:gd name="connsiteY3" fmla="*/ 215447 h 503479"/>
+                <a:gd name="connsiteX4" fmla="*/ 0 w 216024"/>
+                <a:gd name="connsiteY4" fmla="*/ 287455 h 503479"/>
+                <a:gd name="connsiteX5" fmla="*/ 216024 w 216024"/>
+                <a:gd name="connsiteY5" fmla="*/ 359463 h 503479"/>
+                <a:gd name="connsiteX6" fmla="*/ 0 w 216024"/>
+                <a:gd name="connsiteY6" fmla="*/ 431471 h 503479"/>
+                <a:gd name="connsiteX7" fmla="*/ 120233 w 216024"/>
+                <a:gd name="connsiteY7" fmla="*/ 503479 h 503479"/>
+              </a:gdLst>
+              <a:ahLst/>
+              <a:cxnLst>
+                <a:cxn ang="0">
+                  <a:pos x="connsiteX0" y="connsiteY0"/>
+                </a:cxn>
+                <a:cxn ang="0">
+                  <a:pos x="connsiteX1" y="connsiteY1"/>
+                </a:cxn>
+                <a:cxn ang="0">
+                  <a:pos x="connsiteX2" y="connsiteY2"/>
+                </a:cxn>
+                <a:cxn ang="0">
+                  <a:pos x="connsiteX3" y="connsiteY3"/>
+                </a:cxn>
+                <a:cxn ang="0">
+                  <a:pos x="connsiteX4" y="connsiteY4"/>
+                </a:cxn>
+                <a:cxn ang="0">
+                  <a:pos x="connsiteX5" y="connsiteY5"/>
+                </a:cxn>
+                <a:cxn ang="0">
+                  <a:pos x="connsiteX6" y="connsiteY6"/>
+                </a:cxn>
+                <a:cxn ang="0">
+                  <a:pos x="connsiteX7" y="connsiteY7"/>
+                </a:cxn>
+              </a:cxnLst>
+              <a:rect l="l" t="t" r="r" b="b"/>
+              <a:pathLst>
+                <a:path w="216024" h="503479">
+                  <a:moveTo>
+                    <a:pt x="115577" y="0"/>
+                  </a:moveTo>
+                  <a:lnTo>
+                    <a:pt x="216024" y="71431"/>
+                  </a:lnTo>
+                  <a:lnTo>
+                    <a:pt x="0" y="143439"/>
+                  </a:lnTo>
+                  <a:lnTo>
+                    <a:pt x="216024" y="215447"/>
+                  </a:lnTo>
+                  <a:lnTo>
+                    <a:pt x="0" y="287455"/>
+                  </a:lnTo>
+                  <a:lnTo>
+                    <a:pt x="216024" y="359463"/>
+                  </a:lnTo>
+                  <a:lnTo>
+                    <a:pt x="0" y="431471"/>
+                  </a:lnTo>
+                  <a:lnTo>
+                    <a:pt x="120233" y="503479"/>
+                  </a:lnTo>
+                </a:path>
+              </a:pathLst>
+            </a:custGeom>
+            <a:ln w="28575">
+              <a:solidFill>
+                <a:schemeClr val="tx1"/>
+              </a:solidFill>
+            </a:ln>
+          </p:spPr>
+          <p:style>
+            <a:lnRef idx="1">
+              <a:schemeClr val="accent1"/>
+            </a:lnRef>
+            <a:fillRef idx="0">
+              <a:schemeClr val="accent1"/>
+            </a:fillRef>
+            <a:effectRef idx="0">
+              <a:schemeClr val="accent1"/>
+            </a:effectRef>
+            <a:fontRef idx="minor">
+              <a:schemeClr val="tx1"/>
+            </a:fontRef>
+          </p:style>
+          <p:txBody>
+            <a:bodyPr rtlCol="0" anchor="ctr"/>
+            <a:lstStyle/>
+            <a:p>
+              <a:pPr algn="ctr"/>
+              <a:endParaRPr lang="de-DE"/>
+            </a:p>
+          </p:txBody>
+        </p:sp>
+      </p:grpSp>
+      <p:sp>
+        <p:nvSpPr>
+          <p:cNvPr id="44" name="Textfeld 43"/>
+          <p:cNvSpPr txBox="1"/>
+          <p:nvPr/>
+        </p:nvSpPr>
+        <p:spPr>
+          <a:xfrm>
+            <a:off x="755576" y="1459634"/>
+            <a:ext cx="410689" cy="369332"/>
+          </a:xfrm>
+          <a:prstGeom prst="rect">
+            <a:avLst/>
+          </a:prstGeom>
+          <a:noFill/>
+        </p:spPr>
+        <p:txBody>
+          <a:bodyPr wrap="none" rtlCol="0">
+            <a:spAutoFit/>
+          </a:bodyPr>
+          <a:lstStyle/>
+          <a:p>
+            <a:pPr algn="r"/>
+            <a:r>
+              <a:rPr lang="de-DE" i="1" dirty="0" smtClean="0">
+                <a:latin typeface="Arial" pitchFamily="34" charset="0"/>
+                <a:cs typeface="Arial" pitchFamily="34" charset="0"/>
+              </a:rPr>
+              <a:t>Z</a:t>
+            </a:r>
+            <a:r>
+              <a:rPr lang="de-DE" i="1" baseline="-25000" dirty="0" smtClean="0">
+                <a:latin typeface="Arial" pitchFamily="34" charset="0"/>
+                <a:cs typeface="Arial" pitchFamily="34" charset="0"/>
+              </a:rPr>
+              <a:t>0</a:t>
+            </a:r>
+            <a:endParaRPr lang="de-DE" i="1" baseline="-25000" dirty="0">
+              <a:latin typeface="Arial" pitchFamily="34" charset="0"/>
+              <a:cs typeface="Arial" pitchFamily="34" charset="0"/>
+            </a:endParaRPr>
+          </a:p>
+        </p:txBody>
+      </p:sp>
+      <p:sp>
+        <p:nvSpPr>
+          <p:cNvPr id="53" name="Ellipse 52"/>
+          <p:cNvSpPr/>
+          <p:nvPr/>
+        </p:nvSpPr>
+        <p:spPr>
+          <a:xfrm>
+            <a:off x="323528" y="2681196"/>
+            <a:ext cx="432048" cy="432048"/>
+          </a:xfrm>
+          <a:prstGeom prst="ellipse">
+            <a:avLst/>
+          </a:prstGeom>
+          <a:solidFill>
+            <a:schemeClr val="bg1"/>
+          </a:solidFill>
+          <a:ln w="19050">
+            <a:solidFill>
+              <a:schemeClr val="tx1"/>
+            </a:solidFill>
+          </a:ln>
+        </p:spPr>
+        <p:style>
+          <a:lnRef idx="2">
+            <a:schemeClr val="accent1">
+              <a:shade val="50000"/>
+            </a:schemeClr>
+          </a:lnRef>
+          <a:fillRef idx="1">
+            <a:schemeClr val="accent1"/>
+          </a:fillRef>
+          <a:effectRef idx="0">
+            <a:schemeClr val="accent1"/>
+          </a:effectRef>
+          <a:fontRef idx="minor">
+            <a:schemeClr val="lt1"/>
+          </a:fontRef>
+        </p:style>
+        <p:txBody>
+          <a:bodyPr rtlCol="0" anchor="ctr"/>
+          <a:lstStyle/>
+          <a:p>
+            <a:pPr algn="r"/>
+            <a:r>
+              <a:rPr lang="de-DE" i="1" dirty="0" smtClean="0">
+                <a:solidFill>
+                  <a:schemeClr val="tx1"/>
+                </a:solidFill>
+                <a:latin typeface="Arial" pitchFamily="34" charset="0"/>
+                <a:cs typeface="Arial" pitchFamily="34" charset="0"/>
+              </a:rPr>
+              <a:t>V</a:t>
+            </a:r>
+            <a:endParaRPr lang="de-DE" i="1" dirty="0">
+              <a:solidFill>
+                <a:schemeClr val="tx1"/>
+              </a:solidFill>
+              <a:latin typeface="Arial" pitchFamily="34" charset="0"/>
+              <a:cs typeface="Arial" pitchFamily="34" charset="0"/>
             </a:endParaRPr>
           </a:p>
         </p:txBody>

</xml_diff>